<commit_message>
Updated slides and added software page.
</commit_message>
<xml_diff>
--- a/Lectures/CSE 599V Lecture 2- Modeling Essentials.pptx
+++ b/Lectures/CSE 599V Lecture 2- Modeling Essentials.pptx
@@ -5,16 +5,19 @@
     <p:sldMasterId id="2147483648" r:id="rId1"/>
   </p:sldMasterIdLst>
   <p:notesMasterIdLst>
-    <p:notesMasterId r:id="rId6"/>
+    <p:notesMasterId r:id="rId9"/>
   </p:notesMasterIdLst>
   <p:handoutMasterIdLst>
-    <p:handoutMasterId r:id="rId7"/>
+    <p:handoutMasterId r:id="rId10"/>
   </p:handoutMasterIdLst>
   <p:sldIdLst>
     <p:sldId id="347" r:id="rId2"/>
     <p:sldId id="353" r:id="rId3"/>
     <p:sldId id="354" r:id="rId4"/>
-    <p:sldId id="355" r:id="rId5"/>
+    <p:sldId id="356" r:id="rId5"/>
+    <p:sldId id="355" r:id="rId6"/>
+    <p:sldId id="357" r:id="rId7"/>
+    <p:sldId id="358" r:id="rId8"/>
   </p:sldIdLst>
   <p:sldSz cx="9144000" cy="6858000" type="screen4x3"/>
   <p:notesSz cx="6858000" cy="9144000"/>
@@ -903,6 +906,96 @@
 </p:notes>
 </file>
 
+<file path=ppt/notesSlides/notesSlide2.xml><?xml version="1.0" encoding="utf-8"?>
+<p:notes xmlns:a="http://schemas.openxmlformats.org/drawingml/2006/main" xmlns:r="http://schemas.openxmlformats.org/officeDocument/2006/relationships" xmlns:p="http://schemas.openxmlformats.org/presentationml/2006/main">
+  <p:cSld>
+    <p:spTree>
+      <p:nvGrpSpPr>
+        <p:cNvPr id="1" name=""/>
+        <p:cNvGrpSpPr/>
+        <p:nvPr/>
+      </p:nvGrpSpPr>
+      <p:grpSpPr>
+        <a:xfrm>
+          <a:off x="0" y="0"/>
+          <a:ext cx="0" cy="0"/>
+          <a:chOff x="0" y="0"/>
+          <a:chExt cx="0" cy="0"/>
+        </a:xfrm>
+      </p:grpSpPr>
+      <p:sp>
+        <p:nvSpPr>
+          <p:cNvPr id="2" name="Slide Image Placeholder 1"/>
+          <p:cNvSpPr>
+            <a:spLocks noGrp="1" noRot="1" noChangeAspect="1"/>
+          </p:cNvSpPr>
+          <p:nvPr>
+            <p:ph type="sldImg"/>
+          </p:nvPr>
+        </p:nvSpPr>
+        <p:spPr/>
+      </p:sp>
+      <p:sp>
+        <p:nvSpPr>
+          <p:cNvPr id="3" name="Notes Placeholder 2"/>
+          <p:cNvSpPr>
+            <a:spLocks noGrp="1"/>
+          </p:cNvSpPr>
+          <p:nvPr>
+            <p:ph type="body" idx="1"/>
+          </p:nvPr>
+        </p:nvSpPr>
+        <p:spPr/>
+        <p:txBody>
+          <a:bodyPr/>
+          <a:lstStyle/>
+          <a:p>
+            <a:endParaRPr lang="en-US" dirty="0"/>
+          </a:p>
+        </p:txBody>
+      </p:sp>
+      <p:sp>
+        <p:nvSpPr>
+          <p:cNvPr id="4" name="Slide Number Placeholder 3"/>
+          <p:cNvSpPr>
+            <a:spLocks noGrp="1"/>
+          </p:cNvSpPr>
+          <p:nvPr>
+            <p:ph type="sldNum" sz="quarter" idx="10"/>
+          </p:nvPr>
+        </p:nvSpPr>
+        <p:spPr/>
+        <p:txBody>
+          <a:bodyPr/>
+          <a:lstStyle/>
+          <a:p>
+            <a:pPr>
+              <a:defRPr/>
+            </a:pPr>
+            <a:fld id="{1E3608CA-DBCA-4E8F-8DAB-6E1AFAF19782}" type="slidenum">
+              <a:rPr lang="en-US" altLang="x-none" smtClean="0"/>
+              <a:pPr>
+                <a:defRPr/>
+              </a:pPr>
+              <a:t>7</a:t>
+            </a:fld>
+            <a:endParaRPr lang="en-US" altLang="x-none"/>
+          </a:p>
+        </p:txBody>
+      </p:sp>
+    </p:spTree>
+    <p:extLst>
+      <p:ext uri="{BB962C8B-B14F-4D97-AF65-F5344CB8AC3E}">
+        <p14:creationId xmlns:p14="http://schemas.microsoft.com/office/powerpoint/2010/main" val="2406026637"/>
+      </p:ext>
+    </p:extLst>
+  </p:cSld>
+  <p:clrMapOvr>
+    <a:masterClrMapping/>
+  </p:clrMapOvr>
+</p:notes>
+</file>
+
 <file path=ppt/slideLayouts/slideLayout1.xml><?xml version="1.0" encoding="utf-8"?>
 <p:sldLayout xmlns:a="http://schemas.openxmlformats.org/drawingml/2006/main" xmlns:r="http://schemas.openxmlformats.org/officeDocument/2006/relationships" xmlns:p="http://schemas.openxmlformats.org/presentationml/2006/main" type="title" preserve="1">
   <p:cSld name="Title Slide">
@@ -3360,8 +3453,20 @@
               <a:defRPr/>
             </a:pPr>
             <a:r>
-              <a:rPr lang="en-US"/>
-              <a:t>Hellerstein &amp; Parekh, 2017</a:t>
+              <a:rPr lang="en-US" dirty="0" err="1"/>
+              <a:t>Hellerstein</a:t>
+            </a:r>
+            <a:r>
+              <a:rPr lang="en-US" dirty="0"/>
+              <a:t> &amp; </a:t>
+            </a:r>
+            <a:r>
+              <a:rPr lang="en-US" dirty="0" err="1"/>
+              <a:t>Sauro</a:t>
+            </a:r>
+            <a:r>
+              <a:rPr lang="en-US" dirty="0"/>
+              <a:t>, 2018</a:t>
             </a:r>
           </a:p>
         </p:txBody>
@@ -3378,8 +3483,8 @@
         </p:nvSpPr>
         <p:spPr>
           <a:xfrm>
-            <a:off x="6324600" y="6324600"/>
-            <a:ext cx="1752600" cy="365125"/>
+            <a:off x="7696200" y="6324600"/>
+            <a:ext cx="533400" cy="365125"/>
           </a:xfrm>
         </p:spPr>
         <p:txBody>
@@ -5455,6 +5560,161 @@
       </p:grpSpPr>
       <p:sp>
         <p:nvSpPr>
+          <p:cNvPr id="2" name="Title 1">
+            <a:extLst>
+              <a:ext uri="{FF2B5EF4-FFF2-40B4-BE49-F238E27FC236}">
+                <a16:creationId xmlns:a16="http://schemas.microsoft.com/office/drawing/2014/main" id="{FB916CA3-04BE-6640-9488-801C5C9C169C}"/>
+              </a:ext>
+            </a:extLst>
+          </p:cNvPr>
+          <p:cNvSpPr>
+            <a:spLocks noGrp="1"/>
+          </p:cNvSpPr>
+          <p:nvPr>
+            <p:ph type="title"/>
+          </p:nvPr>
+        </p:nvSpPr>
+        <p:spPr/>
+        <p:txBody>
+          <a:bodyPr/>
+          <a:lstStyle/>
+          <a:p>
+            <a:r>
+              <a:rPr lang="en-US" dirty="0"/>
+              <a:t>Notes on Example</a:t>
+            </a:r>
+          </a:p>
+        </p:txBody>
+      </p:sp>
+      <p:sp>
+        <p:nvSpPr>
+          <p:cNvPr id="3" name="Content Placeholder 2">
+            <a:extLst>
+              <a:ext uri="{FF2B5EF4-FFF2-40B4-BE49-F238E27FC236}">
+                <a16:creationId xmlns:a16="http://schemas.microsoft.com/office/drawing/2014/main" id="{535FA1B5-B10F-3448-A2FB-BD328961A207}"/>
+              </a:ext>
+            </a:extLst>
+          </p:cNvPr>
+          <p:cNvSpPr>
+            <a:spLocks noGrp="1"/>
+          </p:cNvSpPr>
+          <p:nvPr>
+            <p:ph idx="1"/>
+          </p:nvPr>
+        </p:nvSpPr>
+        <p:spPr/>
+        <p:txBody>
+          <a:bodyPr/>
+          <a:lstStyle/>
+          <a:p>
+            <a:r>
+              <a:rPr lang="en-US" sz="2800" dirty="0"/>
+              <a:t>Water level management for lakes</a:t>
+            </a:r>
+          </a:p>
+          <a:p>
+            <a:pPr lvl="1"/>
+            <a:r>
+              <a:rPr lang="en-US" sz="2400" dirty="0"/>
+              <a:t>Lower lake provides constant flow output to supply water</a:t>
+            </a:r>
+          </a:p>
+          <a:p>
+            <a:pPr lvl="1"/>
+            <a:r>
+              <a:rPr lang="en-US" sz="2400" dirty="0"/>
+              <a:t>Upper lake is for recreation and emergency resupply</a:t>
+            </a:r>
+          </a:p>
+          <a:p>
+            <a:pPr lvl="1"/>
+            <a:r>
+              <a:rPr lang="en-US" sz="2400" dirty="0"/>
+              <a:t>Both have springs that feed them</a:t>
+            </a:r>
+          </a:p>
+          <a:p>
+            <a:pPr lvl="1"/>
+            <a:r>
+              <a:rPr lang="en-US" sz="2400" dirty="0"/>
+              <a:t>Upper level can feed lower level</a:t>
+            </a:r>
+          </a:p>
+          <a:p>
+            <a:r>
+              <a:rPr lang="en-US" sz="2800" dirty="0"/>
+              <a:t>Objective: Maximize level of upper lake subject to constraint on level in lower lake.</a:t>
+            </a:r>
+          </a:p>
+        </p:txBody>
+      </p:sp>
+      <p:sp>
+        <p:nvSpPr>
+          <p:cNvPr id="4" name="Slide Number Placeholder 3">
+            <a:extLst>
+              <a:ext uri="{FF2B5EF4-FFF2-40B4-BE49-F238E27FC236}">
+                <a16:creationId xmlns:a16="http://schemas.microsoft.com/office/drawing/2014/main" id="{9B6E5AE1-7D1C-B34B-9D6C-738BF60F0B5F}"/>
+              </a:ext>
+            </a:extLst>
+          </p:cNvPr>
+          <p:cNvSpPr>
+            <a:spLocks noGrp="1"/>
+          </p:cNvSpPr>
+          <p:nvPr>
+            <p:ph type="sldNum" sz="quarter" idx="11"/>
+          </p:nvPr>
+        </p:nvSpPr>
+        <p:spPr/>
+        <p:txBody>
+          <a:bodyPr/>
+          <a:lstStyle/>
+          <a:p>
+            <a:pPr>
+              <a:defRPr/>
+            </a:pPr>
+            <a:fld id="{3EF4E9CC-9D91-476E-91FD-5BEEC1642931}" type="slidenum">
+              <a:rPr lang="en-US" altLang="x-none" smtClean="0"/>
+              <a:pPr>
+                <a:defRPr/>
+              </a:pPr>
+              <a:t>4</a:t>
+            </a:fld>
+            <a:endParaRPr lang="en-US" altLang="x-none"/>
+          </a:p>
+        </p:txBody>
+      </p:sp>
+    </p:spTree>
+    <p:extLst>
+      <p:ext uri="{BB962C8B-B14F-4D97-AF65-F5344CB8AC3E}">
+        <p14:creationId xmlns:p14="http://schemas.microsoft.com/office/powerpoint/2010/main" val="2553460119"/>
+      </p:ext>
+    </p:extLst>
+  </p:cSld>
+  <p:clrMapOvr>
+    <a:masterClrMapping/>
+  </p:clrMapOvr>
+</p:sld>
+</file>
+
+<file path=ppt/slides/slide5.xml><?xml version="1.0" encoding="utf-8"?>
+<p:sld xmlns:a="http://schemas.openxmlformats.org/drawingml/2006/main" xmlns:r="http://schemas.openxmlformats.org/officeDocument/2006/relationships" xmlns:p="http://schemas.openxmlformats.org/presentationml/2006/main">
+  <p:cSld>
+    <p:spTree>
+      <p:nvGrpSpPr>
+        <p:cNvPr id="1" name=""/>
+        <p:cNvGrpSpPr/>
+        <p:nvPr/>
+      </p:nvGrpSpPr>
+      <p:grpSpPr>
+        <a:xfrm>
+          <a:off x="0" y="0"/>
+          <a:ext cx="0" cy="0"/>
+          <a:chOff x="0" y="0"/>
+          <a:chExt cx="0" cy="0"/>
+        </a:xfrm>
+      </p:grpSpPr>
+      <p:sp>
+        <p:nvSpPr>
           <p:cNvPr id="5" name="Title 4">
             <a:extLst>
               <a:ext uri="{FF2B5EF4-FFF2-40B4-BE49-F238E27FC236}">
@@ -5469,12 +5729,20 @@
             <p:ph type="title"/>
           </p:nvPr>
         </p:nvSpPr>
-        <p:spPr/>
+        <p:spPr>
+          <a:xfrm>
+            <a:off x="228600" y="228600"/>
+            <a:ext cx="8458200" cy="838200"/>
+          </a:xfrm>
+        </p:spPr>
         <p:txBody>
           <a:bodyPr/>
           <a:lstStyle/>
           <a:p>
-            <a:endParaRPr lang="en-US"/>
+            <a:r>
+              <a:rPr lang="en-US" dirty="0"/>
+              <a:t>Running Example: Public Water Hydraulics</a:t>
+            </a:r>
           </a:p>
         </p:txBody>
       </p:sp>
@@ -5507,18 +5775,601 @@
               <a:pPr>
                 <a:defRPr/>
               </a:pPr>
-              <a:t>4</a:t>
+              <a:t>5</a:t>
             </a:fld>
             <a:endParaRPr lang="en-US" altLang="x-none"/>
           </a:p>
         </p:txBody>
       </p:sp>
+      <p:pic>
+        <p:nvPicPr>
+          <p:cNvPr id="26" name="Picture 25">
+            <a:extLst>
+              <a:ext uri="{FF2B5EF4-FFF2-40B4-BE49-F238E27FC236}">
+                <a16:creationId xmlns:a16="http://schemas.microsoft.com/office/drawing/2014/main" id="{FBA8CE82-1968-C745-8978-732A2FF3BF01}"/>
+              </a:ext>
+            </a:extLst>
+          </p:cNvPr>
+          <p:cNvPicPr>
+            <a:picLocks noChangeAspect="1"/>
+          </p:cNvPicPr>
+          <p:nvPr/>
+        </p:nvPicPr>
+        <p:blipFill>
+          <a:blip r:embed="rId2"/>
+          <a:stretch>
+            <a:fillRect/>
+          </a:stretch>
+        </p:blipFill>
+        <p:spPr>
+          <a:xfrm>
+            <a:off x="3429000" y="4051300"/>
+            <a:ext cx="2630091" cy="1962453"/>
+          </a:xfrm>
+          <a:prstGeom prst="rect">
+            <a:avLst/>
+          </a:prstGeom>
+        </p:spPr>
+      </p:pic>
+      <p:pic>
+        <p:nvPicPr>
+          <p:cNvPr id="28" name="Picture 27">
+            <a:extLst>
+              <a:ext uri="{FF2B5EF4-FFF2-40B4-BE49-F238E27FC236}">
+                <a16:creationId xmlns:a16="http://schemas.microsoft.com/office/drawing/2014/main" id="{505DBFBA-6355-7A49-9762-30CC3933A16D}"/>
+              </a:ext>
+            </a:extLst>
+          </p:cNvPr>
+          <p:cNvPicPr>
+            <a:picLocks noChangeAspect="1"/>
+          </p:cNvPicPr>
+          <p:nvPr/>
+        </p:nvPicPr>
+        <p:blipFill>
+          <a:blip r:embed="rId3"/>
+          <a:stretch>
+            <a:fillRect/>
+          </a:stretch>
+        </p:blipFill>
+        <p:spPr>
+          <a:xfrm>
+            <a:off x="4768512" y="2819400"/>
+            <a:ext cx="553047" cy="1231900"/>
+          </a:xfrm>
+          <a:prstGeom prst="rect">
+            <a:avLst/>
+          </a:prstGeom>
+        </p:spPr>
+      </p:pic>
+      <p:pic>
+        <p:nvPicPr>
+          <p:cNvPr id="29" name="Picture 28">
+            <a:extLst>
+              <a:ext uri="{FF2B5EF4-FFF2-40B4-BE49-F238E27FC236}">
+                <a16:creationId xmlns:a16="http://schemas.microsoft.com/office/drawing/2014/main" id="{AF0D924D-092A-AB4A-8921-9AAEF6BF848B}"/>
+              </a:ext>
+            </a:extLst>
+          </p:cNvPr>
+          <p:cNvPicPr>
+            <a:picLocks noChangeAspect="1"/>
+          </p:cNvPicPr>
+          <p:nvPr/>
+        </p:nvPicPr>
+        <p:blipFill>
+          <a:blip r:embed="rId4"/>
+          <a:stretch>
+            <a:fillRect/>
+          </a:stretch>
+        </p:blipFill>
+        <p:spPr>
+          <a:xfrm>
+            <a:off x="609601" y="1066801"/>
+            <a:ext cx="914400" cy="714931"/>
+          </a:xfrm>
+          <a:prstGeom prst="rect">
+            <a:avLst/>
+          </a:prstGeom>
+        </p:spPr>
+      </p:pic>
+      <p:pic>
+        <p:nvPicPr>
+          <p:cNvPr id="30" name="Picture 29">
+            <a:extLst>
+              <a:ext uri="{FF2B5EF4-FFF2-40B4-BE49-F238E27FC236}">
+                <a16:creationId xmlns:a16="http://schemas.microsoft.com/office/drawing/2014/main" id="{FDC834B4-B21A-C44B-8BFB-1BB294769ED1}"/>
+              </a:ext>
+            </a:extLst>
+          </p:cNvPr>
+          <p:cNvPicPr>
+            <a:picLocks noChangeAspect="1"/>
+          </p:cNvPicPr>
+          <p:nvPr/>
+        </p:nvPicPr>
+        <p:blipFill>
+          <a:blip r:embed="rId5"/>
+          <a:stretch>
+            <a:fillRect/>
+          </a:stretch>
+        </p:blipFill>
+        <p:spPr>
+          <a:xfrm>
+            <a:off x="381000" y="1781731"/>
+            <a:ext cx="2450705" cy="1361283"/>
+          </a:xfrm>
+          <a:prstGeom prst="rect">
+            <a:avLst/>
+          </a:prstGeom>
+        </p:spPr>
+      </p:pic>
+      <p:pic>
+        <p:nvPicPr>
+          <p:cNvPr id="31" name="Picture 30">
+            <a:extLst>
+              <a:ext uri="{FF2B5EF4-FFF2-40B4-BE49-F238E27FC236}">
+                <a16:creationId xmlns:a16="http://schemas.microsoft.com/office/drawing/2014/main" id="{FA23013D-EDF8-6841-AD98-0DFE7A5B34A1}"/>
+              </a:ext>
+            </a:extLst>
+          </p:cNvPr>
+          <p:cNvPicPr>
+            <a:picLocks noChangeAspect="1"/>
+          </p:cNvPicPr>
+          <p:nvPr/>
+        </p:nvPicPr>
+        <p:blipFill>
+          <a:blip r:embed="rId3"/>
+          <a:stretch>
+            <a:fillRect/>
+          </a:stretch>
+        </p:blipFill>
+        <p:spPr>
+          <a:xfrm>
+            <a:off x="5429845" y="2819400"/>
+            <a:ext cx="553047" cy="1231900"/>
+          </a:xfrm>
+          <a:prstGeom prst="rect">
+            <a:avLst/>
+          </a:prstGeom>
+        </p:spPr>
+      </p:pic>
+      <p:pic>
+        <p:nvPicPr>
+          <p:cNvPr id="32" name="Picture 31">
+            <a:extLst>
+              <a:ext uri="{FF2B5EF4-FFF2-40B4-BE49-F238E27FC236}">
+                <a16:creationId xmlns:a16="http://schemas.microsoft.com/office/drawing/2014/main" id="{9D081F26-E7AE-2847-992B-9FD9F6DAAAF4}"/>
+              </a:ext>
+            </a:extLst>
+          </p:cNvPr>
+          <p:cNvPicPr>
+            <a:picLocks noChangeAspect="1"/>
+          </p:cNvPicPr>
+          <p:nvPr/>
+        </p:nvPicPr>
+        <p:blipFill>
+          <a:blip r:embed="rId3"/>
+          <a:stretch>
+            <a:fillRect/>
+          </a:stretch>
+        </p:blipFill>
+        <p:spPr>
+          <a:xfrm>
+            <a:off x="4134445" y="2819400"/>
+            <a:ext cx="553047" cy="1231900"/>
+          </a:xfrm>
+          <a:prstGeom prst="rect">
+            <a:avLst/>
+          </a:prstGeom>
+        </p:spPr>
+      </p:pic>
+      <p:pic>
+        <p:nvPicPr>
+          <p:cNvPr id="33" name="Picture 32">
+            <a:extLst>
+              <a:ext uri="{FF2B5EF4-FFF2-40B4-BE49-F238E27FC236}">
+                <a16:creationId xmlns:a16="http://schemas.microsoft.com/office/drawing/2014/main" id="{47C99A78-29D9-E243-A205-AFB35148E4C0}"/>
+              </a:ext>
+            </a:extLst>
+          </p:cNvPr>
+          <p:cNvPicPr>
+            <a:picLocks noChangeAspect="1"/>
+          </p:cNvPicPr>
+          <p:nvPr/>
+        </p:nvPicPr>
+        <p:blipFill>
+          <a:blip r:embed="rId4"/>
+          <a:stretch>
+            <a:fillRect/>
+          </a:stretch>
+        </p:blipFill>
+        <p:spPr>
+          <a:xfrm>
+            <a:off x="1676400" y="1066800"/>
+            <a:ext cx="914400" cy="714931"/>
+          </a:xfrm>
+          <a:prstGeom prst="rect">
+            <a:avLst/>
+          </a:prstGeom>
+        </p:spPr>
+      </p:pic>
+      <p:pic>
+        <p:nvPicPr>
+          <p:cNvPr id="34" name="Picture 33">
+            <a:extLst>
+              <a:ext uri="{FF2B5EF4-FFF2-40B4-BE49-F238E27FC236}">
+                <a16:creationId xmlns:a16="http://schemas.microsoft.com/office/drawing/2014/main" id="{44DD90E9-3D57-FE4A-9869-3F0FA575BB04}"/>
+              </a:ext>
+            </a:extLst>
+          </p:cNvPr>
+          <p:cNvPicPr>
+            <a:picLocks noChangeAspect="1"/>
+          </p:cNvPicPr>
+          <p:nvPr/>
+        </p:nvPicPr>
+        <p:blipFill>
+          <a:blip r:embed="rId6"/>
+          <a:stretch>
+            <a:fillRect/>
+          </a:stretch>
+        </p:blipFill>
+        <p:spPr>
+          <a:xfrm flipH="1">
+            <a:off x="1777605" y="3143014"/>
+            <a:ext cx="2108200" cy="952500"/>
+          </a:xfrm>
+          <a:prstGeom prst="rect">
+            <a:avLst/>
+          </a:prstGeom>
+        </p:spPr>
+      </p:pic>
+      <p:sp>
+        <p:nvSpPr>
+          <p:cNvPr id="35" name="TextBox 34">
+            <a:extLst>
+              <a:ext uri="{FF2B5EF4-FFF2-40B4-BE49-F238E27FC236}">
+                <a16:creationId xmlns:a16="http://schemas.microsoft.com/office/drawing/2014/main" id="{EA1026F4-85F5-A845-A7F8-5A69D529D5EC}"/>
+              </a:ext>
+            </a:extLst>
+          </p:cNvPr>
+          <p:cNvSpPr txBox="1"/>
+          <p:nvPr/>
+        </p:nvSpPr>
+        <p:spPr>
+          <a:xfrm>
+            <a:off x="6172200" y="4397625"/>
+            <a:ext cx="2514600" cy="1323439"/>
+          </a:xfrm>
+          <a:prstGeom prst="rect">
+            <a:avLst/>
+          </a:prstGeom>
+          <a:noFill/>
+        </p:spPr>
+        <p:txBody>
+          <a:bodyPr wrap="square" rtlCol="0">
+            <a:spAutoFit/>
+          </a:bodyPr>
+          <a:lstStyle/>
+          <a:p>
+            <a:r>
+              <a:rPr lang="en-US" sz="2000" dirty="0"/>
+              <a:t>Reservoir provides public water</a:t>
+            </a:r>
+          </a:p>
+          <a:p>
+            <a:pPr marL="285750" indent="-285750">
+              <a:buFont typeface="Arial" panose="020B0604020202020204" pitchFamily="34" charset="0"/>
+              <a:buChar char="•"/>
+            </a:pPr>
+            <a:r>
+              <a:rPr lang="en-US" sz="2000" dirty="0"/>
+              <a:t>Water level</a:t>
+            </a:r>
+          </a:p>
+          <a:p>
+            <a:pPr marL="285750" indent="-285750">
+              <a:buFont typeface="Arial" panose="020B0604020202020204" pitchFamily="34" charset="0"/>
+              <a:buChar char="•"/>
+            </a:pPr>
+            <a:r>
+              <a:rPr lang="en-US" sz="2000" dirty="0"/>
+              <a:t>Flow rate</a:t>
+            </a:r>
+          </a:p>
+        </p:txBody>
+      </p:sp>
+      <p:sp>
+        <p:nvSpPr>
+          <p:cNvPr id="36" name="TextBox 35">
+            <a:extLst>
+              <a:ext uri="{FF2B5EF4-FFF2-40B4-BE49-F238E27FC236}">
+                <a16:creationId xmlns:a16="http://schemas.microsoft.com/office/drawing/2014/main" id="{8FCB524B-1565-CA4B-9F59-196F44EBAA85}"/>
+              </a:ext>
+            </a:extLst>
+          </p:cNvPr>
+          <p:cNvSpPr txBox="1"/>
+          <p:nvPr/>
+        </p:nvSpPr>
+        <p:spPr>
+          <a:xfrm>
+            <a:off x="6096000" y="2741595"/>
+            <a:ext cx="2514600" cy="707886"/>
+          </a:xfrm>
+          <a:prstGeom prst="rect">
+            <a:avLst/>
+          </a:prstGeom>
+          <a:noFill/>
+        </p:spPr>
+        <p:txBody>
+          <a:bodyPr wrap="square" rtlCol="0">
+            <a:spAutoFit/>
+          </a:bodyPr>
+          <a:lstStyle/>
+          <a:p>
+            <a:r>
+              <a:rPr lang="en-US" sz="2000" dirty="0"/>
+              <a:t>Streams fill reservoir</a:t>
+            </a:r>
+          </a:p>
+          <a:p>
+            <a:pPr marL="342900" indent="-342900">
+              <a:buFont typeface="Arial" panose="020B0604020202020204" pitchFamily="34" charset="0"/>
+              <a:buChar char="•"/>
+            </a:pPr>
+            <a:r>
+              <a:rPr lang="en-US" sz="2000" dirty="0"/>
+              <a:t>Flow rate</a:t>
+            </a:r>
+          </a:p>
+        </p:txBody>
+      </p:sp>
+      <p:sp>
+        <p:nvSpPr>
+          <p:cNvPr id="37" name="TextBox 36">
+            <a:extLst>
+              <a:ext uri="{FF2B5EF4-FFF2-40B4-BE49-F238E27FC236}">
+                <a16:creationId xmlns:a16="http://schemas.microsoft.com/office/drawing/2014/main" id="{737A50FC-A00E-F041-8024-227B4AF7D71B}"/>
+              </a:ext>
+            </a:extLst>
+          </p:cNvPr>
+          <p:cNvSpPr txBox="1"/>
+          <p:nvPr/>
+        </p:nvSpPr>
+        <p:spPr>
+          <a:xfrm>
+            <a:off x="2930484" y="1752600"/>
+            <a:ext cx="3052407" cy="1015663"/>
+          </a:xfrm>
+          <a:prstGeom prst="rect">
+            <a:avLst/>
+          </a:prstGeom>
+          <a:noFill/>
+        </p:spPr>
+        <p:txBody>
+          <a:bodyPr wrap="square" rtlCol="0">
+            <a:spAutoFit/>
+          </a:bodyPr>
+          <a:lstStyle/>
+          <a:p>
+            <a:r>
+              <a:rPr lang="en-US" sz="2000" dirty="0"/>
+              <a:t>Lake provides recreation</a:t>
+            </a:r>
+          </a:p>
+          <a:p>
+            <a:pPr marL="342900" indent="-342900">
+              <a:buFont typeface="Arial" panose="020B0604020202020204" pitchFamily="34" charset="0"/>
+              <a:buChar char="•"/>
+            </a:pPr>
+            <a:r>
+              <a:rPr lang="en-US" sz="2000" dirty="0"/>
+              <a:t>Water level</a:t>
+            </a:r>
+          </a:p>
+          <a:p>
+            <a:pPr marL="342900" indent="-342900">
+              <a:buFont typeface="Arial" panose="020B0604020202020204" pitchFamily="34" charset="0"/>
+              <a:buChar char="•"/>
+            </a:pPr>
+            <a:r>
+              <a:rPr lang="en-US" sz="2000" dirty="0"/>
+              <a:t>Flow rate</a:t>
+            </a:r>
+          </a:p>
+        </p:txBody>
+      </p:sp>
+      <p:sp>
+        <p:nvSpPr>
+          <p:cNvPr id="38" name="TextBox 37">
+            <a:extLst>
+              <a:ext uri="{FF2B5EF4-FFF2-40B4-BE49-F238E27FC236}">
+                <a16:creationId xmlns:a16="http://schemas.microsoft.com/office/drawing/2014/main" id="{ECBC6359-E1F1-1C45-8223-845435068E8B}"/>
+              </a:ext>
+            </a:extLst>
+          </p:cNvPr>
+          <p:cNvSpPr txBox="1"/>
+          <p:nvPr/>
+        </p:nvSpPr>
+        <p:spPr>
+          <a:xfrm>
+            <a:off x="2743200" y="942727"/>
+            <a:ext cx="2514600" cy="707886"/>
+          </a:xfrm>
+          <a:prstGeom prst="rect">
+            <a:avLst/>
+          </a:prstGeom>
+          <a:noFill/>
+        </p:spPr>
+        <p:txBody>
+          <a:bodyPr wrap="square" rtlCol="0">
+            <a:spAutoFit/>
+          </a:bodyPr>
+          <a:lstStyle/>
+          <a:p>
+            <a:r>
+              <a:rPr lang="en-US" sz="2000" dirty="0"/>
+              <a:t>Streams fill lake</a:t>
+            </a:r>
+          </a:p>
+          <a:p>
+            <a:pPr marL="342900" indent="-342900">
+              <a:buFont typeface="Arial" panose="020B0604020202020204" pitchFamily="34" charset="0"/>
+              <a:buChar char="•"/>
+            </a:pPr>
+            <a:r>
+              <a:rPr lang="en-US" sz="2000" dirty="0"/>
+              <a:t>Flow rate</a:t>
+            </a:r>
+          </a:p>
+        </p:txBody>
+      </p:sp>
+      <p:sp>
+        <p:nvSpPr>
+          <p:cNvPr id="39" name="TextBox 38">
+            <a:extLst>
+              <a:ext uri="{FF2B5EF4-FFF2-40B4-BE49-F238E27FC236}">
+                <a16:creationId xmlns:a16="http://schemas.microsoft.com/office/drawing/2014/main" id="{B4138F32-C7DD-B447-8F27-765066009010}"/>
+              </a:ext>
+            </a:extLst>
+          </p:cNvPr>
+          <p:cNvSpPr txBox="1"/>
+          <p:nvPr/>
+        </p:nvSpPr>
+        <p:spPr>
+          <a:xfrm>
+            <a:off x="457200" y="3906721"/>
+            <a:ext cx="2514600" cy="1015663"/>
+          </a:xfrm>
+          <a:prstGeom prst="rect">
+            <a:avLst/>
+          </a:prstGeom>
+          <a:noFill/>
+        </p:spPr>
+        <p:txBody>
+          <a:bodyPr wrap="square" rtlCol="0">
+            <a:spAutoFit/>
+          </a:bodyPr>
+          <a:lstStyle/>
+          <a:p>
+            <a:r>
+              <a:rPr lang="en-US" sz="2000" dirty="0"/>
+              <a:t>Pipe provides lake water to reservoir</a:t>
+            </a:r>
+          </a:p>
+          <a:p>
+            <a:pPr marL="342900" indent="-342900">
+              <a:buFont typeface="Arial" panose="020B0604020202020204" pitchFamily="34" charset="0"/>
+              <a:buChar char="•"/>
+            </a:pPr>
+            <a:r>
+              <a:rPr lang="en-US" sz="2000" dirty="0"/>
+              <a:t>Flow rate</a:t>
+            </a:r>
+          </a:p>
+        </p:txBody>
+      </p:sp>
+    </p:spTree>
+    <p:extLst>
+      <p:ext uri="{BB962C8B-B14F-4D97-AF65-F5344CB8AC3E}">
+        <p14:creationId xmlns:p14="http://schemas.microsoft.com/office/powerpoint/2010/main" val="2851440819"/>
+      </p:ext>
+    </p:extLst>
+  </p:cSld>
+  <p:clrMapOvr>
+    <a:masterClrMapping/>
+  </p:clrMapOvr>
+</p:sld>
+</file>
+
+<file path=ppt/slides/slide6.xml><?xml version="1.0" encoding="utf-8"?>
+<p:sld xmlns:a="http://schemas.openxmlformats.org/drawingml/2006/main" xmlns:r="http://schemas.openxmlformats.org/officeDocument/2006/relationships" xmlns:p="http://schemas.openxmlformats.org/presentationml/2006/main">
+  <p:cSld>
+    <p:spTree>
+      <p:nvGrpSpPr>
+        <p:cNvPr id="1" name=""/>
+        <p:cNvGrpSpPr/>
+        <p:nvPr/>
+      </p:nvGrpSpPr>
+      <p:grpSpPr>
+        <a:xfrm>
+          <a:off x="0" y="0"/>
+          <a:ext cx="0" cy="0"/>
+          <a:chOff x="0" y="0"/>
+          <a:chExt cx="0" cy="0"/>
+        </a:xfrm>
+      </p:grpSpPr>
+      <p:sp>
+        <p:nvSpPr>
+          <p:cNvPr id="5" name="Title 4">
+            <a:extLst>
+              <a:ext uri="{FF2B5EF4-FFF2-40B4-BE49-F238E27FC236}">
+                <a16:creationId xmlns:a16="http://schemas.microsoft.com/office/drawing/2014/main" id="{426B483E-2F08-134B-BDCE-7EE383A5210F}"/>
+              </a:ext>
+            </a:extLst>
+          </p:cNvPr>
+          <p:cNvSpPr>
+            <a:spLocks noGrp="1"/>
+          </p:cNvSpPr>
+          <p:nvPr>
+            <p:ph type="title"/>
+          </p:nvPr>
+        </p:nvSpPr>
+        <p:spPr>
+          <a:xfrm>
+            <a:off x="457200" y="228600"/>
+            <a:ext cx="4724400" cy="838200"/>
+          </a:xfrm>
+        </p:spPr>
+        <p:txBody>
+          <a:bodyPr/>
+          <a:lstStyle/>
+          <a:p>
+            <a:r>
+              <a:rPr lang="en-US" dirty="0"/>
+              <a:t>The Hydraulics Problem</a:t>
+            </a:r>
+          </a:p>
+        </p:txBody>
+      </p:sp>
+      <p:sp>
+        <p:nvSpPr>
+          <p:cNvPr id="4" name="Slide Number Placeholder 3">
+            <a:extLst>
+              <a:ext uri="{FF2B5EF4-FFF2-40B4-BE49-F238E27FC236}">
+                <a16:creationId xmlns:a16="http://schemas.microsoft.com/office/drawing/2014/main" id="{A113FFE1-B004-E540-8C94-331FC54F0960}"/>
+              </a:ext>
+            </a:extLst>
+          </p:cNvPr>
+          <p:cNvSpPr>
+            <a:spLocks noGrp="1"/>
+          </p:cNvSpPr>
+          <p:nvPr>
+            <p:ph type="sldNum" sz="quarter" idx="11"/>
+          </p:nvPr>
+        </p:nvSpPr>
+        <p:spPr/>
+        <p:txBody>
+          <a:bodyPr/>
+          <a:lstStyle/>
+          <a:p>
+            <a:pPr>
+              <a:defRPr/>
+            </a:pPr>
+            <a:fld id="{3EF4E9CC-9D91-476E-91FD-5BEEC1642931}" type="slidenum">
+              <a:rPr lang="en-US" altLang="x-none" smtClean="0"/>
+              <a:pPr>
+                <a:defRPr/>
+              </a:pPr>
+              <a:t>6</a:t>
+            </a:fld>
+            <a:endParaRPr lang="en-US" altLang="x-none"/>
+          </a:p>
+        </p:txBody>
+      </p:sp>
       <p:grpSp>
         <p:nvGrpSpPr>
-          <p:cNvPr id="24" name="Group 23">
+          <p:cNvPr id="2" name="Group 1">
             <a:extLst>
               <a:ext uri="{FF2B5EF4-FFF2-40B4-BE49-F238E27FC236}">
-                <a16:creationId xmlns:a16="http://schemas.microsoft.com/office/drawing/2014/main" id="{648064F9-99C1-3C49-BC96-BD954443D5BB}"/>
+                <a16:creationId xmlns:a16="http://schemas.microsoft.com/office/drawing/2014/main" id="{A46D4BA3-1734-6B49-9145-5CE2DA20AAC3}"/>
               </a:ext>
             </a:extLst>
           </p:cNvPr>
@@ -5527,18 +6378,18 @@
         </p:nvGrpSpPr>
         <p:grpSpPr>
           <a:xfrm>
-            <a:off x="4526280" y="2486978"/>
-            <a:ext cx="2819400" cy="1122045"/>
-            <a:chOff x="4191000" y="1591310"/>
-            <a:chExt cx="2819400" cy="1122045"/>
+            <a:off x="1600200" y="1230844"/>
+            <a:ext cx="4953000" cy="3200400"/>
+            <a:chOff x="381000" y="1066800"/>
+            <a:chExt cx="5678091" cy="4946953"/>
           </a:xfrm>
         </p:grpSpPr>
         <p:pic>
           <p:nvPicPr>
-            <p:cNvPr id="22" name="Picture 21">
+            <p:cNvPr id="26" name="Picture 25">
               <a:extLst>
                 <a:ext uri="{FF2B5EF4-FFF2-40B4-BE49-F238E27FC236}">
-                  <a16:creationId xmlns:a16="http://schemas.microsoft.com/office/drawing/2014/main" id="{F24DF85A-7F1A-5048-B30E-CA5695DE4DA8}"/>
+                  <a16:creationId xmlns:a16="http://schemas.microsoft.com/office/drawing/2014/main" id="{FBA8CE82-1968-C745-8978-732A2FF3BF01}"/>
                 </a:ext>
               </a:extLst>
             </p:cNvPr>
@@ -5555,72 +6406,1531 @@
           </p:blipFill>
           <p:spPr>
             <a:xfrm>
-              <a:off x="4191000" y="1591310"/>
-              <a:ext cx="2819400" cy="1092200"/>
+              <a:off x="3429000" y="4051300"/>
+              <a:ext cx="2630091" cy="1962453"/>
             </a:xfrm>
             <a:prstGeom prst="rect">
               <a:avLst/>
             </a:prstGeom>
           </p:spPr>
         </p:pic>
-        <p:sp>
-          <p:nvSpPr>
-            <p:cNvPr id="23" name="Rectangle 22">
+        <p:pic>
+          <p:nvPicPr>
+            <p:cNvPr id="28" name="Picture 27">
               <a:extLst>
                 <a:ext uri="{FF2B5EF4-FFF2-40B4-BE49-F238E27FC236}">
-                  <a16:creationId xmlns:a16="http://schemas.microsoft.com/office/drawing/2014/main" id="{8777B665-64BA-FD46-B129-6F55BEADD485}"/>
+                  <a16:creationId xmlns:a16="http://schemas.microsoft.com/office/drawing/2014/main" id="{505DBFBA-6355-7A49-9762-30CC3933A16D}"/>
                 </a:ext>
               </a:extLst>
             </p:cNvPr>
-            <p:cNvSpPr/>
+            <p:cNvPicPr>
+              <a:picLocks noChangeAspect="1"/>
+            </p:cNvPicPr>
             <p:nvPr/>
-          </p:nvSpPr>
+          </p:nvPicPr>
+          <p:blipFill>
+            <a:blip r:embed="rId3"/>
+            <a:stretch>
+              <a:fillRect/>
+            </a:stretch>
+          </p:blipFill>
           <p:spPr>
             <a:xfrm>
-              <a:off x="4850130" y="2256155"/>
-              <a:ext cx="2160270" cy="457200"/>
+              <a:off x="4768512" y="2819400"/>
+              <a:ext cx="553047" cy="1231900"/>
             </a:xfrm>
             <a:prstGeom prst="rect">
               <a:avLst/>
             </a:prstGeom>
-            <a:solidFill>
-              <a:schemeClr val="bg1"/>
-            </a:solidFill>
-            <a:ln>
-              <a:noFill/>
-            </a:ln>
-            <a:effectLst/>
           </p:spPr>
-          <p:style>
-            <a:lnRef idx="1">
-              <a:schemeClr val="accent1"/>
-            </a:lnRef>
-            <a:fillRef idx="3">
-              <a:schemeClr val="accent1"/>
-            </a:fillRef>
-            <a:effectRef idx="2">
-              <a:schemeClr val="accent1"/>
-            </a:effectRef>
-            <a:fontRef idx="minor">
-              <a:schemeClr val="lt1"/>
-            </a:fontRef>
-          </p:style>
-          <p:txBody>
-            <a:bodyPr rtlCol="0" anchor="ctr"/>
-            <a:lstStyle/>
-            <a:p>
-              <a:pPr algn="ctr"/>
-              <a:endParaRPr lang="en-US"/>
-            </a:p>
-          </p:txBody>
-        </p:sp>
+        </p:pic>
+        <p:pic>
+          <p:nvPicPr>
+            <p:cNvPr id="29" name="Picture 28">
+              <a:extLst>
+                <a:ext uri="{FF2B5EF4-FFF2-40B4-BE49-F238E27FC236}">
+                  <a16:creationId xmlns:a16="http://schemas.microsoft.com/office/drawing/2014/main" id="{AF0D924D-092A-AB4A-8921-9AAEF6BF848B}"/>
+                </a:ext>
+              </a:extLst>
+            </p:cNvPr>
+            <p:cNvPicPr>
+              <a:picLocks noChangeAspect="1"/>
+            </p:cNvPicPr>
+            <p:nvPr/>
+          </p:nvPicPr>
+          <p:blipFill>
+            <a:blip r:embed="rId4"/>
+            <a:stretch>
+              <a:fillRect/>
+            </a:stretch>
+          </p:blipFill>
+          <p:spPr>
+            <a:xfrm>
+              <a:off x="609601" y="1066801"/>
+              <a:ext cx="914400" cy="714931"/>
+            </a:xfrm>
+            <a:prstGeom prst="rect">
+              <a:avLst/>
+            </a:prstGeom>
+          </p:spPr>
+        </p:pic>
+        <p:pic>
+          <p:nvPicPr>
+            <p:cNvPr id="30" name="Picture 29">
+              <a:extLst>
+                <a:ext uri="{FF2B5EF4-FFF2-40B4-BE49-F238E27FC236}">
+                  <a16:creationId xmlns:a16="http://schemas.microsoft.com/office/drawing/2014/main" id="{FDC834B4-B21A-C44B-8BFB-1BB294769ED1}"/>
+                </a:ext>
+              </a:extLst>
+            </p:cNvPr>
+            <p:cNvPicPr>
+              <a:picLocks noChangeAspect="1"/>
+            </p:cNvPicPr>
+            <p:nvPr/>
+          </p:nvPicPr>
+          <p:blipFill>
+            <a:blip r:embed="rId5"/>
+            <a:stretch>
+              <a:fillRect/>
+            </a:stretch>
+          </p:blipFill>
+          <p:spPr>
+            <a:xfrm>
+              <a:off x="381000" y="1781731"/>
+              <a:ext cx="2450705" cy="1361283"/>
+            </a:xfrm>
+            <a:prstGeom prst="rect">
+              <a:avLst/>
+            </a:prstGeom>
+          </p:spPr>
+        </p:pic>
+        <p:pic>
+          <p:nvPicPr>
+            <p:cNvPr id="31" name="Picture 30">
+              <a:extLst>
+                <a:ext uri="{FF2B5EF4-FFF2-40B4-BE49-F238E27FC236}">
+                  <a16:creationId xmlns:a16="http://schemas.microsoft.com/office/drawing/2014/main" id="{FA23013D-EDF8-6841-AD98-0DFE7A5B34A1}"/>
+                </a:ext>
+              </a:extLst>
+            </p:cNvPr>
+            <p:cNvPicPr>
+              <a:picLocks noChangeAspect="1"/>
+            </p:cNvPicPr>
+            <p:nvPr/>
+          </p:nvPicPr>
+          <p:blipFill>
+            <a:blip r:embed="rId3"/>
+            <a:stretch>
+              <a:fillRect/>
+            </a:stretch>
+          </p:blipFill>
+          <p:spPr>
+            <a:xfrm>
+              <a:off x="5429845" y="2819400"/>
+              <a:ext cx="553047" cy="1231900"/>
+            </a:xfrm>
+            <a:prstGeom prst="rect">
+              <a:avLst/>
+            </a:prstGeom>
+          </p:spPr>
+        </p:pic>
+        <p:pic>
+          <p:nvPicPr>
+            <p:cNvPr id="32" name="Picture 31">
+              <a:extLst>
+                <a:ext uri="{FF2B5EF4-FFF2-40B4-BE49-F238E27FC236}">
+                  <a16:creationId xmlns:a16="http://schemas.microsoft.com/office/drawing/2014/main" id="{9D081F26-E7AE-2847-992B-9FD9F6DAAAF4}"/>
+                </a:ext>
+              </a:extLst>
+            </p:cNvPr>
+            <p:cNvPicPr>
+              <a:picLocks noChangeAspect="1"/>
+            </p:cNvPicPr>
+            <p:nvPr/>
+          </p:nvPicPr>
+          <p:blipFill>
+            <a:blip r:embed="rId3"/>
+            <a:stretch>
+              <a:fillRect/>
+            </a:stretch>
+          </p:blipFill>
+          <p:spPr>
+            <a:xfrm>
+              <a:off x="4134445" y="2819400"/>
+              <a:ext cx="553047" cy="1231900"/>
+            </a:xfrm>
+            <a:prstGeom prst="rect">
+              <a:avLst/>
+            </a:prstGeom>
+          </p:spPr>
+        </p:pic>
+        <p:pic>
+          <p:nvPicPr>
+            <p:cNvPr id="33" name="Picture 32">
+              <a:extLst>
+                <a:ext uri="{FF2B5EF4-FFF2-40B4-BE49-F238E27FC236}">
+                  <a16:creationId xmlns:a16="http://schemas.microsoft.com/office/drawing/2014/main" id="{47C99A78-29D9-E243-A205-AFB35148E4C0}"/>
+                </a:ext>
+              </a:extLst>
+            </p:cNvPr>
+            <p:cNvPicPr>
+              <a:picLocks noChangeAspect="1"/>
+            </p:cNvPicPr>
+            <p:nvPr/>
+          </p:nvPicPr>
+          <p:blipFill>
+            <a:blip r:embed="rId4"/>
+            <a:stretch>
+              <a:fillRect/>
+            </a:stretch>
+          </p:blipFill>
+          <p:spPr>
+            <a:xfrm>
+              <a:off x="1676400" y="1066800"/>
+              <a:ext cx="914400" cy="714931"/>
+            </a:xfrm>
+            <a:prstGeom prst="rect">
+              <a:avLst/>
+            </a:prstGeom>
+          </p:spPr>
+        </p:pic>
+        <p:pic>
+          <p:nvPicPr>
+            <p:cNvPr id="34" name="Picture 33">
+              <a:extLst>
+                <a:ext uri="{FF2B5EF4-FFF2-40B4-BE49-F238E27FC236}">
+                  <a16:creationId xmlns:a16="http://schemas.microsoft.com/office/drawing/2014/main" id="{44DD90E9-3D57-FE4A-9869-3F0FA575BB04}"/>
+                </a:ext>
+              </a:extLst>
+            </p:cNvPr>
+            <p:cNvPicPr>
+              <a:picLocks noChangeAspect="1"/>
+            </p:cNvPicPr>
+            <p:nvPr/>
+          </p:nvPicPr>
+          <p:blipFill>
+            <a:blip r:embed="rId6"/>
+            <a:stretch>
+              <a:fillRect/>
+            </a:stretch>
+          </p:blipFill>
+          <p:spPr>
+            <a:xfrm flipH="1">
+              <a:off x="1777605" y="3143014"/>
+              <a:ext cx="2108200" cy="952500"/>
+            </a:xfrm>
+            <a:prstGeom prst="rect">
+              <a:avLst/>
+            </a:prstGeom>
+          </p:spPr>
+        </p:pic>
       </p:grpSp>
+      <p:sp>
+        <p:nvSpPr>
+          <p:cNvPr id="3" name="TextBox 2">
+            <a:extLst>
+              <a:ext uri="{FF2B5EF4-FFF2-40B4-BE49-F238E27FC236}">
+                <a16:creationId xmlns:a16="http://schemas.microsoft.com/office/drawing/2014/main" id="{05B52B33-E74A-564A-AF51-B6AE2B16D5F3}"/>
+              </a:ext>
+            </a:extLst>
+          </p:cNvPr>
+          <p:cNvSpPr txBox="1"/>
+          <p:nvPr/>
+        </p:nvSpPr>
+        <p:spPr>
+          <a:xfrm>
+            <a:off x="1371600" y="4716840"/>
+            <a:ext cx="7616190" cy="1569660"/>
+          </a:xfrm>
+          <a:prstGeom prst="rect">
+            <a:avLst/>
+          </a:prstGeom>
+          <a:noFill/>
+        </p:spPr>
+        <p:txBody>
+          <a:bodyPr wrap="square" rtlCol="0">
+            <a:spAutoFit/>
+          </a:bodyPr>
+          <a:lstStyle/>
+          <a:p>
+            <a:r>
+              <a:rPr lang="en-US" sz="2400" b="1" dirty="0"/>
+              <a:t>Maximize the level of the lake subject to a minimum level of the reservoir.</a:t>
+            </a:r>
+          </a:p>
+          <a:p>
+            <a:pPr marL="342900" indent="-342900">
+              <a:buFont typeface="Arial" panose="020B0604020202020204" pitchFamily="34" charset="0"/>
+              <a:buChar char="•"/>
+            </a:pPr>
+            <a:r>
+              <a:rPr lang="en-US" sz="2400" dirty="0"/>
+              <a:t>Most recreational benefit to public</a:t>
+            </a:r>
+          </a:p>
+          <a:p>
+            <a:pPr marL="342900" indent="-342900">
+              <a:buFont typeface="Arial" panose="020B0604020202020204" pitchFamily="34" charset="0"/>
+              <a:buChar char="•"/>
+            </a:pPr>
+            <a:r>
+              <a:rPr lang="en-US" sz="2400" dirty="0"/>
+              <a:t>Ensure delivery of quality water to public</a:t>
+            </a:r>
+          </a:p>
+        </p:txBody>
+      </p:sp>
+      <p:cxnSp>
+        <p:nvCxnSpPr>
+          <p:cNvPr id="8" name="Straight Arrow Connector 7">
+            <a:extLst>
+              <a:ext uri="{FF2B5EF4-FFF2-40B4-BE49-F238E27FC236}">
+                <a16:creationId xmlns:a16="http://schemas.microsoft.com/office/drawing/2014/main" id="{D5D0F913-F228-2A4A-840B-9744C4CDAEB8}"/>
+              </a:ext>
+            </a:extLst>
+          </p:cNvPr>
+          <p:cNvCxnSpPr/>
+          <p:nvPr/>
+        </p:nvCxnSpPr>
+        <p:spPr>
+          <a:xfrm>
+            <a:off x="3962400" y="2066603"/>
+            <a:ext cx="0" cy="440437"/>
+          </a:xfrm>
+          <a:prstGeom prst="straightConnector1">
+            <a:avLst/>
+          </a:prstGeom>
+          <a:ln w="28575">
+            <a:headEnd type="triangle"/>
+            <a:tailEnd type="triangle"/>
+          </a:ln>
+        </p:spPr>
+        <p:style>
+          <a:lnRef idx="2">
+            <a:schemeClr val="accent1"/>
+          </a:lnRef>
+          <a:fillRef idx="0">
+            <a:schemeClr val="accent1"/>
+          </a:fillRef>
+          <a:effectRef idx="1">
+            <a:schemeClr val="accent1"/>
+          </a:effectRef>
+          <a:fontRef idx="minor">
+            <a:schemeClr val="tx1"/>
+          </a:fontRef>
+        </p:style>
+      </p:cxnSp>
+      <p:cxnSp>
+        <p:nvCxnSpPr>
+          <p:cNvPr id="10" name="Straight Connector 9">
+            <a:extLst>
+              <a:ext uri="{FF2B5EF4-FFF2-40B4-BE49-F238E27FC236}">
+                <a16:creationId xmlns:a16="http://schemas.microsoft.com/office/drawing/2014/main" id="{F0B08809-8397-674B-A16E-3B3CB1A479F6}"/>
+              </a:ext>
+            </a:extLst>
+          </p:cNvPr>
+          <p:cNvCxnSpPr>
+            <a:cxnSpLocks/>
+          </p:cNvCxnSpPr>
+          <p:nvPr/>
+        </p:nvCxnSpPr>
+        <p:spPr>
+          <a:xfrm flipV="1">
+            <a:off x="3737950" y="2049840"/>
+            <a:ext cx="376850" cy="101"/>
+          </a:xfrm>
+          <a:prstGeom prst="line">
+            <a:avLst/>
+          </a:prstGeom>
+        </p:spPr>
+        <p:style>
+          <a:lnRef idx="2">
+            <a:schemeClr val="accent1"/>
+          </a:lnRef>
+          <a:fillRef idx="0">
+            <a:schemeClr val="accent1"/>
+          </a:fillRef>
+          <a:effectRef idx="1">
+            <a:schemeClr val="accent1"/>
+          </a:effectRef>
+          <a:fontRef idx="minor">
+            <a:schemeClr val="tx1"/>
+          </a:fontRef>
+        </p:style>
+      </p:cxnSp>
+      <p:cxnSp>
+        <p:nvCxnSpPr>
+          <p:cNvPr id="40" name="Straight Connector 39">
+            <a:extLst>
+              <a:ext uri="{FF2B5EF4-FFF2-40B4-BE49-F238E27FC236}">
+                <a16:creationId xmlns:a16="http://schemas.microsoft.com/office/drawing/2014/main" id="{68FDE81B-5921-744E-AF4F-DCDC308A81B2}"/>
+              </a:ext>
+            </a:extLst>
+          </p:cNvPr>
+          <p:cNvCxnSpPr/>
+          <p:nvPr/>
+        </p:nvCxnSpPr>
+        <p:spPr>
+          <a:xfrm flipV="1">
+            <a:off x="3733800" y="2507040"/>
+            <a:ext cx="376850" cy="101"/>
+          </a:xfrm>
+          <a:prstGeom prst="line">
+            <a:avLst/>
+          </a:prstGeom>
+        </p:spPr>
+        <p:style>
+          <a:lnRef idx="2">
+            <a:schemeClr val="accent1"/>
+          </a:lnRef>
+          <a:fillRef idx="0">
+            <a:schemeClr val="accent1"/>
+          </a:fillRef>
+          <a:effectRef idx="1">
+            <a:schemeClr val="accent1"/>
+          </a:effectRef>
+          <a:fontRef idx="minor">
+            <a:schemeClr val="tx1"/>
+          </a:fontRef>
+        </p:style>
+      </p:cxnSp>
+      <p:sp>
+        <p:nvSpPr>
+          <p:cNvPr id="11" name="TextBox 10">
+            <a:extLst>
+              <a:ext uri="{FF2B5EF4-FFF2-40B4-BE49-F238E27FC236}">
+                <a16:creationId xmlns:a16="http://schemas.microsoft.com/office/drawing/2014/main" id="{92E61262-DF4E-A64D-AC3A-2CA7BEB79315}"/>
+              </a:ext>
+            </a:extLst>
+          </p:cNvPr>
+          <p:cNvSpPr txBox="1"/>
+          <p:nvPr/>
+        </p:nvSpPr>
+        <p:spPr>
+          <a:xfrm>
+            <a:off x="4142579" y="1991954"/>
+            <a:ext cx="518091" cy="523220"/>
+          </a:xfrm>
+          <a:prstGeom prst="rect">
+            <a:avLst/>
+          </a:prstGeom>
+          <a:noFill/>
+        </p:spPr>
+        <p:txBody>
+          <a:bodyPr wrap="none" rtlCol="0">
+            <a:spAutoFit/>
+          </a:bodyPr>
+          <a:lstStyle/>
+          <a:p>
+            <a:r>
+              <a:rPr lang="en-US" sz="2800" i="1" dirty="0" err="1"/>
+              <a:t>h</a:t>
+            </a:r>
+            <a:r>
+              <a:rPr lang="en-US" sz="2800" i="1" baseline="-25000" dirty="0" err="1"/>
+              <a:t>L</a:t>
+            </a:r>
+            <a:endParaRPr lang="en-US" sz="2800" i="1" baseline="-25000" dirty="0"/>
+          </a:p>
+        </p:txBody>
+      </p:sp>
+      <p:cxnSp>
+        <p:nvCxnSpPr>
+          <p:cNvPr id="41" name="Straight Arrow Connector 40">
+            <a:extLst>
+              <a:ext uri="{FF2B5EF4-FFF2-40B4-BE49-F238E27FC236}">
+                <a16:creationId xmlns:a16="http://schemas.microsoft.com/office/drawing/2014/main" id="{A23AC45E-4CE8-0A4F-91BD-F0298F566417}"/>
+              </a:ext>
+            </a:extLst>
+          </p:cNvPr>
+          <p:cNvCxnSpPr>
+            <a:cxnSpLocks/>
+          </p:cNvCxnSpPr>
+          <p:nvPr/>
+        </p:nvCxnSpPr>
+        <p:spPr>
+          <a:xfrm>
+            <a:off x="6781800" y="3732249"/>
+            <a:ext cx="0" cy="679690"/>
+          </a:xfrm>
+          <a:prstGeom prst="straightConnector1">
+            <a:avLst/>
+          </a:prstGeom>
+          <a:ln w="28575">
+            <a:headEnd type="triangle"/>
+            <a:tailEnd type="triangle"/>
+          </a:ln>
+        </p:spPr>
+        <p:style>
+          <a:lnRef idx="2">
+            <a:schemeClr val="accent1"/>
+          </a:lnRef>
+          <a:fillRef idx="0">
+            <a:schemeClr val="accent1"/>
+          </a:fillRef>
+          <a:effectRef idx="1">
+            <a:schemeClr val="accent1"/>
+          </a:effectRef>
+          <a:fontRef idx="minor">
+            <a:schemeClr val="tx1"/>
+          </a:fontRef>
+        </p:style>
+      </p:cxnSp>
+      <p:cxnSp>
+        <p:nvCxnSpPr>
+          <p:cNvPr id="42" name="Straight Connector 41">
+            <a:extLst>
+              <a:ext uri="{FF2B5EF4-FFF2-40B4-BE49-F238E27FC236}">
+                <a16:creationId xmlns:a16="http://schemas.microsoft.com/office/drawing/2014/main" id="{8F0E4F40-9C14-3F4A-BE24-21457E949D06}"/>
+              </a:ext>
+            </a:extLst>
+          </p:cNvPr>
+          <p:cNvCxnSpPr>
+            <a:cxnSpLocks/>
+          </p:cNvCxnSpPr>
+          <p:nvPr/>
+        </p:nvCxnSpPr>
+        <p:spPr>
+          <a:xfrm flipV="1">
+            <a:off x="6557350" y="3715486"/>
+            <a:ext cx="376850" cy="101"/>
+          </a:xfrm>
+          <a:prstGeom prst="line">
+            <a:avLst/>
+          </a:prstGeom>
+        </p:spPr>
+        <p:style>
+          <a:lnRef idx="2">
+            <a:schemeClr val="accent1"/>
+          </a:lnRef>
+          <a:fillRef idx="0">
+            <a:schemeClr val="accent1"/>
+          </a:fillRef>
+          <a:effectRef idx="1">
+            <a:schemeClr val="accent1"/>
+          </a:effectRef>
+          <a:fontRef idx="minor">
+            <a:schemeClr val="tx1"/>
+          </a:fontRef>
+        </p:style>
+      </p:cxnSp>
+      <p:cxnSp>
+        <p:nvCxnSpPr>
+          <p:cNvPr id="43" name="Straight Connector 42">
+            <a:extLst>
+              <a:ext uri="{FF2B5EF4-FFF2-40B4-BE49-F238E27FC236}">
+                <a16:creationId xmlns:a16="http://schemas.microsoft.com/office/drawing/2014/main" id="{83F99CE6-ADAB-6E4D-AE8D-F2C943F7A18F}"/>
+              </a:ext>
+            </a:extLst>
+          </p:cNvPr>
+          <p:cNvCxnSpPr/>
+          <p:nvPr/>
+        </p:nvCxnSpPr>
+        <p:spPr>
+          <a:xfrm flipV="1">
+            <a:off x="6553200" y="4411939"/>
+            <a:ext cx="376850" cy="101"/>
+          </a:xfrm>
+          <a:prstGeom prst="line">
+            <a:avLst/>
+          </a:prstGeom>
+        </p:spPr>
+        <p:style>
+          <a:lnRef idx="2">
+            <a:schemeClr val="accent1"/>
+          </a:lnRef>
+          <a:fillRef idx="0">
+            <a:schemeClr val="accent1"/>
+          </a:fillRef>
+          <a:effectRef idx="1">
+            <a:schemeClr val="accent1"/>
+          </a:effectRef>
+          <a:fontRef idx="minor">
+            <a:schemeClr val="tx1"/>
+          </a:fontRef>
+        </p:style>
+      </p:cxnSp>
+      <p:sp>
+        <p:nvSpPr>
+          <p:cNvPr id="44" name="TextBox 43">
+            <a:extLst>
+              <a:ext uri="{FF2B5EF4-FFF2-40B4-BE49-F238E27FC236}">
+                <a16:creationId xmlns:a16="http://schemas.microsoft.com/office/drawing/2014/main" id="{7548746D-5D03-7B49-AA0A-CEB048CD4E25}"/>
+              </a:ext>
+            </a:extLst>
+          </p:cNvPr>
+          <p:cNvSpPr txBox="1"/>
+          <p:nvPr/>
+        </p:nvSpPr>
+        <p:spPr>
+          <a:xfrm>
+            <a:off x="6858000" y="3820180"/>
+            <a:ext cx="558166" cy="523220"/>
+          </a:xfrm>
+          <a:prstGeom prst="rect">
+            <a:avLst/>
+          </a:prstGeom>
+          <a:noFill/>
+        </p:spPr>
+        <p:txBody>
+          <a:bodyPr wrap="none" rtlCol="0">
+            <a:spAutoFit/>
+          </a:bodyPr>
+          <a:lstStyle/>
+          <a:p>
+            <a:r>
+              <a:rPr lang="en-US" sz="2800" i="1" dirty="0" err="1"/>
+              <a:t>h</a:t>
+            </a:r>
+            <a:r>
+              <a:rPr lang="en-US" sz="2800" i="1" baseline="-25000" dirty="0" err="1"/>
+              <a:t>R</a:t>
+            </a:r>
+            <a:endParaRPr lang="en-US" sz="2800" i="1" baseline="-25000" dirty="0"/>
+          </a:p>
+        </p:txBody>
+      </p:sp>
+    </p:spTree>
+    <p:extLst>
+      <p:ext uri="{BB962C8B-B14F-4D97-AF65-F5344CB8AC3E}">
+        <p14:creationId xmlns:p14="http://schemas.microsoft.com/office/powerpoint/2010/main" val="3992427947"/>
+      </p:ext>
+    </p:extLst>
+  </p:cSld>
+  <p:clrMapOvr>
+    <a:masterClrMapping/>
+  </p:clrMapOvr>
+  <p:timing>
+    <p:tnLst>
+      <p:par>
+        <p:cTn id="1" dur="indefinite" restart="never" nodeType="tmRoot">
+          <p:childTnLst>
+            <p:seq concurrent="1" nextAc="seek">
+              <p:cTn id="2" dur="indefinite" nodeType="mainSeq">
+                <p:childTnLst>
+                  <p:par>
+                    <p:cTn id="3" fill="hold">
+                      <p:stCondLst>
+                        <p:cond delay="indefinite"/>
+                      </p:stCondLst>
+                      <p:childTnLst>
+                        <p:par>
+                          <p:cTn id="4" fill="hold">
+                            <p:stCondLst>
+                              <p:cond delay="0"/>
+                            </p:stCondLst>
+                            <p:childTnLst>
+                              <p:par>
+                                <p:cTn id="5" presetID="1" presetClass="entr" presetSubtype="0" fill="hold" nodeType="clickEffect">
+                                  <p:stCondLst>
+                                    <p:cond delay="0"/>
+                                  </p:stCondLst>
+                                  <p:childTnLst>
+                                    <p:set>
+                                      <p:cBhvr>
+                                        <p:cTn id="6" dur="1" fill="hold">
+                                          <p:stCondLst>
+                                            <p:cond delay="0"/>
+                                          </p:stCondLst>
+                                        </p:cTn>
+                                        <p:tgtEl>
+                                          <p:spTgt spid="8"/>
+                                        </p:tgtEl>
+                                        <p:attrNameLst>
+                                          <p:attrName>style.visibility</p:attrName>
+                                        </p:attrNameLst>
+                                      </p:cBhvr>
+                                      <p:to>
+                                        <p:strVal val="visible"/>
+                                      </p:to>
+                                    </p:set>
+                                  </p:childTnLst>
+                                </p:cTn>
+                              </p:par>
+                              <p:par>
+                                <p:cTn id="7" presetID="1" presetClass="entr" presetSubtype="0" fill="hold" nodeType="withEffect">
+                                  <p:stCondLst>
+                                    <p:cond delay="0"/>
+                                  </p:stCondLst>
+                                  <p:childTnLst>
+                                    <p:set>
+                                      <p:cBhvr>
+                                        <p:cTn id="8" dur="1" fill="hold">
+                                          <p:stCondLst>
+                                            <p:cond delay="0"/>
+                                          </p:stCondLst>
+                                        </p:cTn>
+                                        <p:tgtEl>
+                                          <p:spTgt spid="10"/>
+                                        </p:tgtEl>
+                                        <p:attrNameLst>
+                                          <p:attrName>style.visibility</p:attrName>
+                                        </p:attrNameLst>
+                                      </p:cBhvr>
+                                      <p:to>
+                                        <p:strVal val="visible"/>
+                                      </p:to>
+                                    </p:set>
+                                  </p:childTnLst>
+                                </p:cTn>
+                              </p:par>
+                              <p:par>
+                                <p:cTn id="9" presetID="1" presetClass="entr" presetSubtype="0" fill="hold" nodeType="withEffect">
+                                  <p:stCondLst>
+                                    <p:cond delay="0"/>
+                                  </p:stCondLst>
+                                  <p:childTnLst>
+                                    <p:set>
+                                      <p:cBhvr>
+                                        <p:cTn id="10" dur="1" fill="hold">
+                                          <p:stCondLst>
+                                            <p:cond delay="0"/>
+                                          </p:stCondLst>
+                                        </p:cTn>
+                                        <p:tgtEl>
+                                          <p:spTgt spid="40"/>
+                                        </p:tgtEl>
+                                        <p:attrNameLst>
+                                          <p:attrName>style.visibility</p:attrName>
+                                        </p:attrNameLst>
+                                      </p:cBhvr>
+                                      <p:to>
+                                        <p:strVal val="visible"/>
+                                      </p:to>
+                                    </p:set>
+                                  </p:childTnLst>
+                                </p:cTn>
+                              </p:par>
+                              <p:par>
+                                <p:cTn id="11" presetID="1" presetClass="entr" presetSubtype="0" fill="hold" nodeType="withEffect">
+                                  <p:stCondLst>
+                                    <p:cond delay="0"/>
+                                  </p:stCondLst>
+                                  <p:childTnLst>
+                                    <p:set>
+                                      <p:cBhvr>
+                                        <p:cTn id="12" dur="1" fill="hold">
+                                          <p:stCondLst>
+                                            <p:cond delay="0"/>
+                                          </p:stCondLst>
+                                        </p:cTn>
+                                        <p:tgtEl>
+                                          <p:spTgt spid="41"/>
+                                        </p:tgtEl>
+                                        <p:attrNameLst>
+                                          <p:attrName>style.visibility</p:attrName>
+                                        </p:attrNameLst>
+                                      </p:cBhvr>
+                                      <p:to>
+                                        <p:strVal val="visible"/>
+                                      </p:to>
+                                    </p:set>
+                                  </p:childTnLst>
+                                </p:cTn>
+                              </p:par>
+                              <p:par>
+                                <p:cTn id="13" presetID="1" presetClass="entr" presetSubtype="0" fill="hold" nodeType="withEffect">
+                                  <p:stCondLst>
+                                    <p:cond delay="0"/>
+                                  </p:stCondLst>
+                                  <p:childTnLst>
+                                    <p:set>
+                                      <p:cBhvr>
+                                        <p:cTn id="14" dur="1" fill="hold">
+                                          <p:stCondLst>
+                                            <p:cond delay="0"/>
+                                          </p:stCondLst>
+                                        </p:cTn>
+                                        <p:tgtEl>
+                                          <p:spTgt spid="42"/>
+                                        </p:tgtEl>
+                                        <p:attrNameLst>
+                                          <p:attrName>style.visibility</p:attrName>
+                                        </p:attrNameLst>
+                                      </p:cBhvr>
+                                      <p:to>
+                                        <p:strVal val="visible"/>
+                                      </p:to>
+                                    </p:set>
+                                  </p:childTnLst>
+                                </p:cTn>
+                              </p:par>
+                              <p:par>
+                                <p:cTn id="15" presetID="1" presetClass="entr" presetSubtype="0" fill="hold" nodeType="withEffect">
+                                  <p:stCondLst>
+                                    <p:cond delay="0"/>
+                                  </p:stCondLst>
+                                  <p:childTnLst>
+                                    <p:set>
+                                      <p:cBhvr>
+                                        <p:cTn id="16" dur="1" fill="hold">
+                                          <p:stCondLst>
+                                            <p:cond delay="0"/>
+                                          </p:stCondLst>
+                                        </p:cTn>
+                                        <p:tgtEl>
+                                          <p:spTgt spid="43"/>
+                                        </p:tgtEl>
+                                        <p:attrNameLst>
+                                          <p:attrName>style.visibility</p:attrName>
+                                        </p:attrNameLst>
+                                      </p:cBhvr>
+                                      <p:to>
+                                        <p:strVal val="visible"/>
+                                      </p:to>
+                                    </p:set>
+                                  </p:childTnLst>
+                                </p:cTn>
+                              </p:par>
+                              <p:par>
+                                <p:cTn id="17" presetID="1" presetClass="entr" presetSubtype="0" fill="hold" grpId="0" nodeType="withEffect">
+                                  <p:stCondLst>
+                                    <p:cond delay="0"/>
+                                  </p:stCondLst>
+                                  <p:childTnLst>
+                                    <p:set>
+                                      <p:cBhvr>
+                                        <p:cTn id="18" dur="1" fill="hold">
+                                          <p:stCondLst>
+                                            <p:cond delay="0"/>
+                                          </p:stCondLst>
+                                        </p:cTn>
+                                        <p:tgtEl>
+                                          <p:spTgt spid="11"/>
+                                        </p:tgtEl>
+                                        <p:attrNameLst>
+                                          <p:attrName>style.visibility</p:attrName>
+                                        </p:attrNameLst>
+                                      </p:cBhvr>
+                                      <p:to>
+                                        <p:strVal val="visible"/>
+                                      </p:to>
+                                    </p:set>
+                                  </p:childTnLst>
+                                </p:cTn>
+                              </p:par>
+                              <p:par>
+                                <p:cTn id="19" presetID="1" presetClass="entr" presetSubtype="0" fill="hold" grpId="0" nodeType="withEffect">
+                                  <p:stCondLst>
+                                    <p:cond delay="0"/>
+                                  </p:stCondLst>
+                                  <p:childTnLst>
+                                    <p:set>
+                                      <p:cBhvr>
+                                        <p:cTn id="20" dur="1" fill="hold">
+                                          <p:stCondLst>
+                                            <p:cond delay="0"/>
+                                          </p:stCondLst>
+                                        </p:cTn>
+                                        <p:tgtEl>
+                                          <p:spTgt spid="44"/>
+                                        </p:tgtEl>
+                                        <p:attrNameLst>
+                                          <p:attrName>style.visibility</p:attrName>
+                                        </p:attrNameLst>
+                                      </p:cBhvr>
+                                      <p:to>
+                                        <p:strVal val="visible"/>
+                                      </p:to>
+                                    </p:set>
+                                  </p:childTnLst>
+                                </p:cTn>
+                              </p:par>
+                              <p:par>
+                                <p:cTn id="21" presetID="1" presetClass="entr" presetSubtype="0" fill="hold" grpId="0" nodeType="withEffect">
+                                  <p:stCondLst>
+                                    <p:cond delay="0"/>
+                                  </p:stCondLst>
+                                  <p:childTnLst>
+                                    <p:set>
+                                      <p:cBhvr>
+                                        <p:cTn id="22" dur="1" fill="hold">
+                                          <p:stCondLst>
+                                            <p:cond delay="0"/>
+                                          </p:stCondLst>
+                                        </p:cTn>
+                                        <p:tgtEl>
+                                          <p:spTgt spid="3">
+                                            <p:txEl>
+                                              <p:pRg st="0" end="0"/>
+                                            </p:txEl>
+                                          </p:spTgt>
+                                        </p:tgtEl>
+                                        <p:attrNameLst>
+                                          <p:attrName>style.visibility</p:attrName>
+                                        </p:attrNameLst>
+                                      </p:cBhvr>
+                                      <p:to>
+                                        <p:strVal val="visible"/>
+                                      </p:to>
+                                    </p:set>
+                                  </p:childTnLst>
+                                </p:cTn>
+                              </p:par>
+                            </p:childTnLst>
+                          </p:cTn>
+                        </p:par>
+                      </p:childTnLst>
+                    </p:cTn>
+                  </p:par>
+                  <p:par>
+                    <p:cTn id="23" fill="hold">
+                      <p:stCondLst>
+                        <p:cond delay="indefinite"/>
+                      </p:stCondLst>
+                      <p:childTnLst>
+                        <p:par>
+                          <p:cTn id="24" fill="hold">
+                            <p:stCondLst>
+                              <p:cond delay="0"/>
+                            </p:stCondLst>
+                            <p:childTnLst>
+                              <p:par>
+                                <p:cTn id="25" presetID="1" presetClass="entr" presetSubtype="0" fill="hold" grpId="0" nodeType="clickEffect">
+                                  <p:stCondLst>
+                                    <p:cond delay="0"/>
+                                  </p:stCondLst>
+                                  <p:childTnLst>
+                                    <p:set>
+                                      <p:cBhvr>
+                                        <p:cTn id="26" dur="1" fill="hold">
+                                          <p:stCondLst>
+                                            <p:cond delay="0"/>
+                                          </p:stCondLst>
+                                        </p:cTn>
+                                        <p:tgtEl>
+                                          <p:spTgt spid="3">
+                                            <p:txEl>
+                                              <p:pRg st="1" end="1"/>
+                                            </p:txEl>
+                                          </p:spTgt>
+                                        </p:tgtEl>
+                                        <p:attrNameLst>
+                                          <p:attrName>style.visibility</p:attrName>
+                                        </p:attrNameLst>
+                                      </p:cBhvr>
+                                      <p:to>
+                                        <p:strVal val="visible"/>
+                                      </p:to>
+                                    </p:set>
+                                  </p:childTnLst>
+                                </p:cTn>
+                              </p:par>
+                            </p:childTnLst>
+                          </p:cTn>
+                        </p:par>
+                      </p:childTnLst>
+                    </p:cTn>
+                  </p:par>
+                  <p:par>
+                    <p:cTn id="27" fill="hold">
+                      <p:stCondLst>
+                        <p:cond delay="indefinite"/>
+                      </p:stCondLst>
+                      <p:childTnLst>
+                        <p:par>
+                          <p:cTn id="28" fill="hold">
+                            <p:stCondLst>
+                              <p:cond delay="0"/>
+                            </p:stCondLst>
+                            <p:childTnLst>
+                              <p:par>
+                                <p:cTn id="29" presetID="1" presetClass="entr" presetSubtype="0" fill="hold" grpId="0" nodeType="clickEffect">
+                                  <p:stCondLst>
+                                    <p:cond delay="0"/>
+                                  </p:stCondLst>
+                                  <p:childTnLst>
+                                    <p:set>
+                                      <p:cBhvr>
+                                        <p:cTn id="30" dur="1" fill="hold">
+                                          <p:stCondLst>
+                                            <p:cond delay="0"/>
+                                          </p:stCondLst>
+                                        </p:cTn>
+                                        <p:tgtEl>
+                                          <p:spTgt spid="3">
+                                            <p:txEl>
+                                              <p:pRg st="2" end="2"/>
+                                            </p:txEl>
+                                          </p:spTgt>
+                                        </p:tgtEl>
+                                        <p:attrNameLst>
+                                          <p:attrName>style.visibility</p:attrName>
+                                        </p:attrNameLst>
+                                      </p:cBhvr>
+                                      <p:to>
+                                        <p:strVal val="visible"/>
+                                      </p:to>
+                                    </p:set>
+                                  </p:childTnLst>
+                                </p:cTn>
+                              </p:par>
+                            </p:childTnLst>
+                          </p:cTn>
+                        </p:par>
+                      </p:childTnLst>
+                    </p:cTn>
+                  </p:par>
+                </p:childTnLst>
+              </p:cTn>
+              <p:prevCondLst>
+                <p:cond evt="onPrev" delay="0">
+                  <p:tgtEl>
+                    <p:sldTgt/>
+                  </p:tgtEl>
+                </p:cond>
+              </p:prevCondLst>
+              <p:nextCondLst>
+                <p:cond evt="onNext" delay="0">
+                  <p:tgtEl>
+                    <p:sldTgt/>
+                  </p:tgtEl>
+                </p:cond>
+              </p:nextCondLst>
+            </p:seq>
+          </p:childTnLst>
+        </p:cTn>
+      </p:par>
+    </p:tnLst>
+    <p:bldLst>
+      <p:bldP spid="3" grpId="0" build="p"/>
+      <p:bldP spid="11" grpId="0"/>
+      <p:bldP spid="44" grpId="0"/>
+    </p:bldLst>
+  </p:timing>
+</p:sld>
+</file>
+
+<file path=ppt/slides/slide7.xml><?xml version="1.0" encoding="utf-8"?>
+<p:sld xmlns:a="http://schemas.openxmlformats.org/drawingml/2006/main" xmlns:r="http://schemas.openxmlformats.org/officeDocument/2006/relationships" xmlns:p="http://schemas.openxmlformats.org/presentationml/2006/main">
+  <p:cSld>
+    <p:spTree>
+      <p:nvGrpSpPr>
+        <p:cNvPr id="1" name=""/>
+        <p:cNvGrpSpPr/>
+        <p:nvPr/>
+      </p:nvGrpSpPr>
+      <p:grpSpPr>
+        <a:xfrm>
+          <a:off x="0" y="0"/>
+          <a:ext cx="0" cy="0"/>
+          <a:chOff x="0" y="0"/>
+          <a:chExt cx="0" cy="0"/>
+        </a:xfrm>
+      </p:grpSpPr>
+      <p:sp>
+        <p:nvSpPr>
+          <p:cNvPr id="5" name="Title 4">
+            <a:extLst>
+              <a:ext uri="{FF2B5EF4-FFF2-40B4-BE49-F238E27FC236}">
+                <a16:creationId xmlns:a16="http://schemas.microsoft.com/office/drawing/2014/main" id="{426B483E-2F08-134B-BDCE-7EE383A5210F}"/>
+              </a:ext>
+            </a:extLst>
+          </p:cNvPr>
+          <p:cNvSpPr>
+            <a:spLocks noGrp="1"/>
+          </p:cNvSpPr>
+          <p:nvPr>
+            <p:ph type="title"/>
+          </p:nvPr>
+        </p:nvSpPr>
+        <p:spPr>
+          <a:xfrm>
+            <a:off x="457200" y="228600"/>
+            <a:ext cx="4724400" cy="838200"/>
+          </a:xfrm>
+        </p:spPr>
+        <p:txBody>
+          <a:bodyPr/>
+          <a:lstStyle/>
+          <a:p>
+            <a:r>
+              <a:rPr lang="en-US" dirty="0"/>
+              <a:t>System Elements</a:t>
+            </a:r>
+          </a:p>
+        </p:txBody>
+      </p:sp>
+      <p:sp>
+        <p:nvSpPr>
+          <p:cNvPr id="4" name="Slide Number Placeholder 3">
+            <a:extLst>
+              <a:ext uri="{FF2B5EF4-FFF2-40B4-BE49-F238E27FC236}">
+                <a16:creationId xmlns:a16="http://schemas.microsoft.com/office/drawing/2014/main" id="{A113FFE1-B004-E540-8C94-331FC54F0960}"/>
+              </a:ext>
+            </a:extLst>
+          </p:cNvPr>
+          <p:cNvSpPr>
+            <a:spLocks noGrp="1"/>
+          </p:cNvSpPr>
+          <p:nvPr>
+            <p:ph type="sldNum" sz="quarter" idx="11"/>
+          </p:nvPr>
+        </p:nvSpPr>
+        <p:spPr/>
+        <p:txBody>
+          <a:bodyPr/>
+          <a:lstStyle/>
+          <a:p>
+            <a:pPr>
+              <a:defRPr/>
+            </a:pPr>
+            <a:fld id="{3EF4E9CC-9D91-476E-91FD-5BEEC1642931}" type="slidenum">
+              <a:rPr lang="en-US" altLang="x-none" smtClean="0"/>
+              <a:pPr>
+                <a:defRPr/>
+              </a:pPr>
+              <a:t>7</a:t>
+            </a:fld>
+            <a:endParaRPr lang="en-US" altLang="x-none"/>
+          </a:p>
+        </p:txBody>
+      </p:sp>
+      <p:grpSp>
+        <p:nvGrpSpPr>
+          <p:cNvPr id="2" name="Group 1">
+            <a:extLst>
+              <a:ext uri="{FF2B5EF4-FFF2-40B4-BE49-F238E27FC236}">
+                <a16:creationId xmlns:a16="http://schemas.microsoft.com/office/drawing/2014/main" id="{A46D4BA3-1734-6B49-9145-5CE2DA20AAC3}"/>
+              </a:ext>
+            </a:extLst>
+          </p:cNvPr>
+          <p:cNvGrpSpPr/>
+          <p:nvPr/>
+        </p:nvGrpSpPr>
+        <p:grpSpPr>
+          <a:xfrm>
+            <a:off x="7162801" y="381000"/>
+            <a:ext cx="1600200" cy="911377"/>
+            <a:chOff x="381000" y="1066800"/>
+            <a:chExt cx="5678091" cy="4946953"/>
+          </a:xfrm>
+        </p:grpSpPr>
+        <p:pic>
+          <p:nvPicPr>
+            <p:cNvPr id="26" name="Picture 25">
+              <a:extLst>
+                <a:ext uri="{FF2B5EF4-FFF2-40B4-BE49-F238E27FC236}">
+                  <a16:creationId xmlns:a16="http://schemas.microsoft.com/office/drawing/2014/main" id="{FBA8CE82-1968-C745-8978-732A2FF3BF01}"/>
+                </a:ext>
+              </a:extLst>
+            </p:cNvPr>
+            <p:cNvPicPr>
+              <a:picLocks noChangeAspect="1"/>
+            </p:cNvPicPr>
+            <p:nvPr/>
+          </p:nvPicPr>
+          <p:blipFill>
+            <a:blip r:embed="rId3"/>
+            <a:stretch>
+              <a:fillRect/>
+            </a:stretch>
+          </p:blipFill>
+          <p:spPr>
+            <a:xfrm>
+              <a:off x="3429000" y="4051300"/>
+              <a:ext cx="2630091" cy="1962453"/>
+            </a:xfrm>
+            <a:prstGeom prst="rect">
+              <a:avLst/>
+            </a:prstGeom>
+          </p:spPr>
+        </p:pic>
+        <p:pic>
+          <p:nvPicPr>
+            <p:cNvPr id="28" name="Picture 27">
+              <a:extLst>
+                <a:ext uri="{FF2B5EF4-FFF2-40B4-BE49-F238E27FC236}">
+                  <a16:creationId xmlns:a16="http://schemas.microsoft.com/office/drawing/2014/main" id="{505DBFBA-6355-7A49-9762-30CC3933A16D}"/>
+                </a:ext>
+              </a:extLst>
+            </p:cNvPr>
+            <p:cNvPicPr>
+              <a:picLocks noChangeAspect="1"/>
+            </p:cNvPicPr>
+            <p:nvPr/>
+          </p:nvPicPr>
+          <p:blipFill>
+            <a:blip r:embed="rId4"/>
+            <a:stretch>
+              <a:fillRect/>
+            </a:stretch>
+          </p:blipFill>
+          <p:spPr>
+            <a:xfrm>
+              <a:off x="4768512" y="2819400"/>
+              <a:ext cx="553047" cy="1231900"/>
+            </a:xfrm>
+            <a:prstGeom prst="rect">
+              <a:avLst/>
+            </a:prstGeom>
+          </p:spPr>
+        </p:pic>
+        <p:pic>
+          <p:nvPicPr>
+            <p:cNvPr id="29" name="Picture 28">
+              <a:extLst>
+                <a:ext uri="{FF2B5EF4-FFF2-40B4-BE49-F238E27FC236}">
+                  <a16:creationId xmlns:a16="http://schemas.microsoft.com/office/drawing/2014/main" id="{AF0D924D-092A-AB4A-8921-9AAEF6BF848B}"/>
+                </a:ext>
+              </a:extLst>
+            </p:cNvPr>
+            <p:cNvPicPr>
+              <a:picLocks noChangeAspect="1"/>
+            </p:cNvPicPr>
+            <p:nvPr/>
+          </p:nvPicPr>
+          <p:blipFill>
+            <a:blip r:embed="rId5"/>
+            <a:stretch>
+              <a:fillRect/>
+            </a:stretch>
+          </p:blipFill>
+          <p:spPr>
+            <a:xfrm>
+              <a:off x="609601" y="1066801"/>
+              <a:ext cx="914400" cy="714931"/>
+            </a:xfrm>
+            <a:prstGeom prst="rect">
+              <a:avLst/>
+            </a:prstGeom>
+          </p:spPr>
+        </p:pic>
+        <p:pic>
+          <p:nvPicPr>
+            <p:cNvPr id="30" name="Picture 29">
+              <a:extLst>
+                <a:ext uri="{FF2B5EF4-FFF2-40B4-BE49-F238E27FC236}">
+                  <a16:creationId xmlns:a16="http://schemas.microsoft.com/office/drawing/2014/main" id="{FDC834B4-B21A-C44B-8BFB-1BB294769ED1}"/>
+                </a:ext>
+              </a:extLst>
+            </p:cNvPr>
+            <p:cNvPicPr>
+              <a:picLocks noChangeAspect="1"/>
+            </p:cNvPicPr>
+            <p:nvPr/>
+          </p:nvPicPr>
+          <p:blipFill>
+            <a:blip r:embed="rId6"/>
+            <a:stretch>
+              <a:fillRect/>
+            </a:stretch>
+          </p:blipFill>
+          <p:spPr>
+            <a:xfrm>
+              <a:off x="381000" y="1781731"/>
+              <a:ext cx="2450705" cy="1361283"/>
+            </a:xfrm>
+            <a:prstGeom prst="rect">
+              <a:avLst/>
+            </a:prstGeom>
+          </p:spPr>
+        </p:pic>
+        <p:pic>
+          <p:nvPicPr>
+            <p:cNvPr id="31" name="Picture 30">
+              <a:extLst>
+                <a:ext uri="{FF2B5EF4-FFF2-40B4-BE49-F238E27FC236}">
+                  <a16:creationId xmlns:a16="http://schemas.microsoft.com/office/drawing/2014/main" id="{FA23013D-EDF8-6841-AD98-0DFE7A5B34A1}"/>
+                </a:ext>
+              </a:extLst>
+            </p:cNvPr>
+            <p:cNvPicPr>
+              <a:picLocks noChangeAspect="1"/>
+            </p:cNvPicPr>
+            <p:nvPr/>
+          </p:nvPicPr>
+          <p:blipFill>
+            <a:blip r:embed="rId4"/>
+            <a:stretch>
+              <a:fillRect/>
+            </a:stretch>
+          </p:blipFill>
+          <p:spPr>
+            <a:xfrm>
+              <a:off x="5429845" y="2819400"/>
+              <a:ext cx="553047" cy="1231900"/>
+            </a:xfrm>
+            <a:prstGeom prst="rect">
+              <a:avLst/>
+            </a:prstGeom>
+          </p:spPr>
+        </p:pic>
+        <p:pic>
+          <p:nvPicPr>
+            <p:cNvPr id="32" name="Picture 31">
+              <a:extLst>
+                <a:ext uri="{FF2B5EF4-FFF2-40B4-BE49-F238E27FC236}">
+                  <a16:creationId xmlns:a16="http://schemas.microsoft.com/office/drawing/2014/main" id="{9D081F26-E7AE-2847-992B-9FD9F6DAAAF4}"/>
+                </a:ext>
+              </a:extLst>
+            </p:cNvPr>
+            <p:cNvPicPr>
+              <a:picLocks noChangeAspect="1"/>
+            </p:cNvPicPr>
+            <p:nvPr/>
+          </p:nvPicPr>
+          <p:blipFill>
+            <a:blip r:embed="rId4"/>
+            <a:stretch>
+              <a:fillRect/>
+            </a:stretch>
+          </p:blipFill>
+          <p:spPr>
+            <a:xfrm>
+              <a:off x="4134445" y="2819400"/>
+              <a:ext cx="553047" cy="1231900"/>
+            </a:xfrm>
+            <a:prstGeom prst="rect">
+              <a:avLst/>
+            </a:prstGeom>
+          </p:spPr>
+        </p:pic>
+        <p:pic>
+          <p:nvPicPr>
+            <p:cNvPr id="33" name="Picture 32">
+              <a:extLst>
+                <a:ext uri="{FF2B5EF4-FFF2-40B4-BE49-F238E27FC236}">
+                  <a16:creationId xmlns:a16="http://schemas.microsoft.com/office/drawing/2014/main" id="{47C99A78-29D9-E243-A205-AFB35148E4C0}"/>
+                </a:ext>
+              </a:extLst>
+            </p:cNvPr>
+            <p:cNvPicPr>
+              <a:picLocks noChangeAspect="1"/>
+            </p:cNvPicPr>
+            <p:nvPr/>
+          </p:nvPicPr>
+          <p:blipFill>
+            <a:blip r:embed="rId5"/>
+            <a:stretch>
+              <a:fillRect/>
+            </a:stretch>
+          </p:blipFill>
+          <p:spPr>
+            <a:xfrm>
+              <a:off x="1676400" y="1066800"/>
+              <a:ext cx="914400" cy="714931"/>
+            </a:xfrm>
+            <a:prstGeom prst="rect">
+              <a:avLst/>
+            </a:prstGeom>
+          </p:spPr>
+        </p:pic>
+        <p:pic>
+          <p:nvPicPr>
+            <p:cNvPr id="34" name="Picture 33">
+              <a:extLst>
+                <a:ext uri="{FF2B5EF4-FFF2-40B4-BE49-F238E27FC236}">
+                  <a16:creationId xmlns:a16="http://schemas.microsoft.com/office/drawing/2014/main" id="{44DD90E9-3D57-FE4A-9869-3F0FA575BB04}"/>
+                </a:ext>
+              </a:extLst>
+            </p:cNvPr>
+            <p:cNvPicPr>
+              <a:picLocks noChangeAspect="1"/>
+            </p:cNvPicPr>
+            <p:nvPr/>
+          </p:nvPicPr>
+          <p:blipFill>
+            <a:blip r:embed="rId7"/>
+            <a:stretch>
+              <a:fillRect/>
+            </a:stretch>
+          </p:blipFill>
+          <p:spPr>
+            <a:xfrm flipH="1">
+              <a:off x="1777605" y="3143014"/>
+              <a:ext cx="2108200" cy="952500"/>
+            </a:xfrm>
+            <a:prstGeom prst="rect">
+              <a:avLst/>
+            </a:prstGeom>
+          </p:spPr>
+        </p:pic>
+      </p:grpSp>
+      <p:sp>
+        <p:nvSpPr>
+          <p:cNvPr id="3" name="TextBox 2">
+            <a:extLst>
+              <a:ext uri="{FF2B5EF4-FFF2-40B4-BE49-F238E27FC236}">
+                <a16:creationId xmlns:a16="http://schemas.microsoft.com/office/drawing/2014/main" id="{05B52B33-E74A-564A-AF51-B6AE2B16D5F3}"/>
+              </a:ext>
+            </a:extLst>
+          </p:cNvPr>
+          <p:cNvSpPr txBox="1"/>
+          <p:nvPr/>
+        </p:nvSpPr>
+        <p:spPr>
+          <a:xfrm>
+            <a:off x="228601" y="1295400"/>
+            <a:ext cx="8534400" cy="830997"/>
+          </a:xfrm>
+          <a:prstGeom prst="rect">
+            <a:avLst/>
+          </a:prstGeom>
+          <a:noFill/>
+        </p:spPr>
+        <p:txBody>
+          <a:bodyPr wrap="square" rtlCol="0">
+            <a:spAutoFit/>
+          </a:bodyPr>
+          <a:lstStyle/>
+          <a:p>
+            <a:r>
+              <a:rPr lang="en-US" sz="2400" b="1" dirty="0"/>
+              <a:t>Element Abstractions: </a:t>
+            </a:r>
+            <a:r>
+              <a:rPr lang="en-US" sz="2400" dirty="0"/>
+              <a:t>Simplified representation of components</a:t>
+            </a:r>
+            <a:endParaRPr lang="en-US" sz="2400" b="1" dirty="0"/>
+          </a:p>
+        </p:txBody>
+      </p:sp>
       <p:pic>
         <p:nvPicPr>
-          <p:cNvPr id="25" name="Picture 24">
+          <p:cNvPr id="19" name="Picture 18">
             <a:extLst>
               <a:ext uri="{FF2B5EF4-FFF2-40B4-BE49-F238E27FC236}">
-                <a16:creationId xmlns:a16="http://schemas.microsoft.com/office/drawing/2014/main" id="{4128A9F4-743C-AA4B-AC24-081E34387C6B}"/>
+                <a16:creationId xmlns:a16="http://schemas.microsoft.com/office/drawing/2014/main" id="{AF8A3F6C-DC1B-2446-A5F9-4D14FA89F1FD}"/>
+              </a:ext>
+            </a:extLst>
+          </p:cNvPr>
+          <p:cNvPicPr>
+            <a:picLocks noChangeAspect="1"/>
+          </p:cNvPicPr>
+          <p:nvPr/>
+        </p:nvPicPr>
+        <p:blipFill>
+          <a:blip r:embed="rId5"/>
+          <a:stretch>
+            <a:fillRect/>
+          </a:stretch>
+        </p:blipFill>
+        <p:spPr>
+          <a:xfrm>
+            <a:off x="2514600" y="2782234"/>
+            <a:ext cx="914400" cy="714931"/>
+          </a:xfrm>
+          <a:prstGeom prst="rect">
+            <a:avLst/>
+          </a:prstGeom>
+        </p:spPr>
+      </p:pic>
+      <p:pic>
+        <p:nvPicPr>
+          <p:cNvPr id="20" name="Picture 19">
+            <a:extLst>
+              <a:ext uri="{FF2B5EF4-FFF2-40B4-BE49-F238E27FC236}">
+                <a16:creationId xmlns:a16="http://schemas.microsoft.com/office/drawing/2014/main" id="{324DEA68-10A2-A648-B85B-8D329D853B4B}"/>
+              </a:ext>
+            </a:extLst>
+          </p:cNvPr>
+          <p:cNvPicPr>
+            <a:picLocks noChangeAspect="1"/>
+          </p:cNvPicPr>
+          <p:nvPr/>
+        </p:nvPicPr>
+        <p:blipFill>
+          <a:blip r:embed="rId4"/>
+          <a:stretch>
+            <a:fillRect/>
+          </a:stretch>
+        </p:blipFill>
+        <p:spPr>
+          <a:xfrm>
+            <a:off x="3581400" y="2793157"/>
+            <a:ext cx="553047" cy="1231900"/>
+          </a:xfrm>
+          <a:prstGeom prst="rect">
+            <a:avLst/>
+          </a:prstGeom>
+        </p:spPr>
+      </p:pic>
+      <p:sp>
+        <p:nvSpPr>
+          <p:cNvPr id="6" name="TextBox 5">
+            <a:extLst>
+              <a:ext uri="{FF2B5EF4-FFF2-40B4-BE49-F238E27FC236}">
+                <a16:creationId xmlns:a16="http://schemas.microsoft.com/office/drawing/2014/main" id="{3CF87D43-2174-8F4A-9314-A6B2F97E8F9A}"/>
+              </a:ext>
+            </a:extLst>
+          </p:cNvPr>
+          <p:cNvSpPr txBox="1"/>
+          <p:nvPr/>
+        </p:nvSpPr>
+        <p:spPr>
+          <a:xfrm>
+            <a:off x="152400" y="2793157"/>
+            <a:ext cx="2005806" cy="400110"/>
+          </a:xfrm>
+          <a:prstGeom prst="rect">
+            <a:avLst/>
+          </a:prstGeom>
+          <a:noFill/>
+        </p:spPr>
+        <p:txBody>
+          <a:bodyPr wrap="none" rtlCol="0">
+            <a:spAutoFit/>
+          </a:bodyPr>
+          <a:lstStyle/>
+          <a:p>
+            <a:r>
+              <a:rPr lang="en-US" sz="2000" b="1" dirty="0"/>
+              <a:t>Water sources</a:t>
+            </a:r>
+            <a:r>
+              <a:rPr lang="en-US" dirty="0"/>
+              <a:t>:</a:t>
+            </a:r>
+          </a:p>
+        </p:txBody>
+      </p:sp>
+      <p:sp>
+        <p:nvSpPr>
+          <p:cNvPr id="22" name="TextBox 21">
+            <a:extLst>
+              <a:ext uri="{FF2B5EF4-FFF2-40B4-BE49-F238E27FC236}">
+                <a16:creationId xmlns:a16="http://schemas.microsoft.com/office/drawing/2014/main" id="{2293B3C0-9683-EB4C-B7CD-61CD482ADCEC}"/>
+              </a:ext>
+            </a:extLst>
+          </p:cNvPr>
+          <p:cNvSpPr txBox="1"/>
+          <p:nvPr/>
+        </p:nvSpPr>
+        <p:spPr>
+          <a:xfrm>
+            <a:off x="167640" y="4450657"/>
+            <a:ext cx="2318392" cy="400110"/>
+          </a:xfrm>
+          <a:prstGeom prst="rect">
+            <a:avLst/>
+          </a:prstGeom>
+          <a:noFill/>
+        </p:spPr>
+        <p:txBody>
+          <a:bodyPr wrap="none" rtlCol="0">
+            <a:spAutoFit/>
+          </a:bodyPr>
+          <a:lstStyle/>
+          <a:p>
+            <a:r>
+              <a:rPr lang="en-US" sz="2000" b="1" dirty="0"/>
+              <a:t>Water containers</a:t>
+            </a:r>
+            <a:r>
+              <a:rPr lang="en-US" dirty="0"/>
+              <a:t>:</a:t>
+            </a:r>
+          </a:p>
+        </p:txBody>
+      </p:sp>
+      <p:pic>
+        <p:nvPicPr>
+          <p:cNvPr id="23" name="Picture 22">
+            <a:extLst>
+              <a:ext uri="{FF2B5EF4-FFF2-40B4-BE49-F238E27FC236}">
+                <a16:creationId xmlns:a16="http://schemas.microsoft.com/office/drawing/2014/main" id="{B2DA8BBB-1470-8147-BC6C-29A44B9B312B}"/>
               </a:ext>
             </a:extLst>
           </p:cNvPr>
@@ -5637,18 +7947,657 @@
         </p:blipFill>
         <p:spPr>
           <a:xfrm>
-            <a:off x="4038600" y="3575368"/>
-            <a:ext cx="1295400" cy="1562100"/>
+            <a:off x="3505200" y="4450657"/>
+            <a:ext cx="877491" cy="654743"/>
           </a:xfrm>
           <a:prstGeom prst="rect">
             <a:avLst/>
           </a:prstGeom>
         </p:spPr>
       </p:pic>
+      <p:pic>
+        <p:nvPicPr>
+          <p:cNvPr id="24" name="Picture 23">
+            <a:extLst>
+              <a:ext uri="{FF2B5EF4-FFF2-40B4-BE49-F238E27FC236}">
+                <a16:creationId xmlns:a16="http://schemas.microsoft.com/office/drawing/2014/main" id="{BD002C37-DA50-6E49-8977-F8EC89BF1A30}"/>
+              </a:ext>
+            </a:extLst>
+          </p:cNvPr>
+          <p:cNvPicPr>
+            <a:picLocks noChangeAspect="1"/>
+          </p:cNvPicPr>
+          <p:nvPr/>
+        </p:nvPicPr>
+        <p:blipFill>
+          <a:blip r:embed="rId6"/>
+          <a:stretch>
+            <a:fillRect/>
+          </a:stretch>
+        </p:blipFill>
+        <p:spPr>
+          <a:xfrm>
+            <a:off x="2438400" y="4450657"/>
+            <a:ext cx="926705" cy="514753"/>
+          </a:xfrm>
+          <a:prstGeom prst="rect">
+            <a:avLst/>
+          </a:prstGeom>
+        </p:spPr>
+      </p:pic>
+      <p:sp>
+        <p:nvSpPr>
+          <p:cNvPr id="25" name="TextBox 24">
+            <a:extLst>
+              <a:ext uri="{FF2B5EF4-FFF2-40B4-BE49-F238E27FC236}">
+                <a16:creationId xmlns:a16="http://schemas.microsoft.com/office/drawing/2014/main" id="{C16BB900-545E-064C-911C-A1B1AC01B4E1}"/>
+              </a:ext>
+            </a:extLst>
+          </p:cNvPr>
+          <p:cNvSpPr txBox="1"/>
+          <p:nvPr/>
+        </p:nvSpPr>
+        <p:spPr>
+          <a:xfrm>
+            <a:off x="167640" y="5424604"/>
+            <a:ext cx="2084225" cy="400110"/>
+          </a:xfrm>
+          <a:prstGeom prst="rect">
+            <a:avLst/>
+          </a:prstGeom>
+          <a:noFill/>
+        </p:spPr>
+        <p:txBody>
+          <a:bodyPr wrap="none" rtlCol="0">
+            <a:spAutoFit/>
+          </a:bodyPr>
+          <a:lstStyle/>
+          <a:p>
+            <a:r>
+              <a:rPr lang="en-US" sz="2000" b="1" dirty="0"/>
+              <a:t>Pipe with valve</a:t>
+            </a:r>
+            <a:r>
+              <a:rPr lang="en-US" dirty="0"/>
+              <a:t>:</a:t>
+            </a:r>
+          </a:p>
+        </p:txBody>
+      </p:sp>
+      <p:pic>
+        <p:nvPicPr>
+          <p:cNvPr id="27" name="Picture 26">
+            <a:extLst>
+              <a:ext uri="{FF2B5EF4-FFF2-40B4-BE49-F238E27FC236}">
+                <a16:creationId xmlns:a16="http://schemas.microsoft.com/office/drawing/2014/main" id="{FEB7B91A-7E38-D846-97E6-6CC9482838CB}"/>
+              </a:ext>
+            </a:extLst>
+          </p:cNvPr>
+          <p:cNvPicPr>
+            <a:picLocks noChangeAspect="1"/>
+          </p:cNvPicPr>
+          <p:nvPr/>
+        </p:nvPicPr>
+        <p:blipFill>
+          <a:blip r:embed="rId7"/>
+          <a:stretch>
+            <a:fillRect/>
+          </a:stretch>
+        </p:blipFill>
+        <p:spPr>
+          <a:xfrm flipH="1">
+            <a:off x="2541538" y="5424604"/>
+            <a:ext cx="1486023" cy="671396"/>
+          </a:xfrm>
+          <a:prstGeom prst="rect">
+            <a:avLst/>
+          </a:prstGeom>
+        </p:spPr>
+      </p:pic>
+      <p:sp>
+        <p:nvSpPr>
+          <p:cNvPr id="35" name="TextBox 34">
+            <a:extLst>
+              <a:ext uri="{FF2B5EF4-FFF2-40B4-BE49-F238E27FC236}">
+                <a16:creationId xmlns:a16="http://schemas.microsoft.com/office/drawing/2014/main" id="{FB605517-F10F-6149-B590-E555E50451C0}"/>
+              </a:ext>
+            </a:extLst>
+          </p:cNvPr>
+          <p:cNvSpPr txBox="1"/>
+          <p:nvPr/>
+        </p:nvSpPr>
+        <p:spPr>
+          <a:xfrm>
+            <a:off x="4800600" y="2154942"/>
+            <a:ext cx="1310230" cy="400110"/>
+          </a:xfrm>
+          <a:prstGeom prst="rect">
+            <a:avLst/>
+          </a:prstGeom>
+          <a:noFill/>
+        </p:spPr>
+        <p:txBody>
+          <a:bodyPr wrap="none" rtlCol="0">
+            <a:spAutoFit/>
+          </a:bodyPr>
+          <a:lstStyle/>
+          <a:p>
+            <a:r>
+              <a:rPr lang="en-US" sz="2000" b="1" dirty="0"/>
+              <a:t>Variables</a:t>
+            </a:r>
+            <a:endParaRPr lang="en-US" dirty="0"/>
+          </a:p>
+        </p:txBody>
+      </p:sp>
+      <p:sp>
+        <p:nvSpPr>
+          <p:cNvPr id="36" name="TextBox 35">
+            <a:extLst>
+              <a:ext uri="{FF2B5EF4-FFF2-40B4-BE49-F238E27FC236}">
+                <a16:creationId xmlns:a16="http://schemas.microsoft.com/office/drawing/2014/main" id="{84D7A28D-9909-7F45-B45A-CA24FA41B48F}"/>
+              </a:ext>
+            </a:extLst>
+          </p:cNvPr>
+          <p:cNvSpPr txBox="1"/>
+          <p:nvPr/>
+        </p:nvSpPr>
+        <p:spPr>
+          <a:xfrm>
+            <a:off x="7098933" y="2154942"/>
+            <a:ext cx="825867" cy="400110"/>
+          </a:xfrm>
+          <a:prstGeom prst="rect">
+            <a:avLst/>
+          </a:prstGeom>
+          <a:noFill/>
+        </p:spPr>
+        <p:txBody>
+          <a:bodyPr wrap="none" rtlCol="0">
+            <a:spAutoFit/>
+          </a:bodyPr>
+          <a:lstStyle/>
+          <a:p>
+            <a:r>
+              <a:rPr lang="en-US" sz="2000" b="1" dirty="0"/>
+              <a:t>Units</a:t>
+            </a:r>
+            <a:endParaRPr lang="en-US" dirty="0"/>
+          </a:p>
+        </p:txBody>
+      </p:sp>
+      <p:sp>
+        <p:nvSpPr>
+          <p:cNvPr id="7" name="TextBox 6">
+            <a:extLst>
+              <a:ext uri="{FF2B5EF4-FFF2-40B4-BE49-F238E27FC236}">
+                <a16:creationId xmlns:a16="http://schemas.microsoft.com/office/drawing/2014/main" id="{26877121-6479-D24A-ABF2-B77774556255}"/>
+              </a:ext>
+            </a:extLst>
+          </p:cNvPr>
+          <p:cNvSpPr txBox="1"/>
+          <p:nvPr/>
+        </p:nvSpPr>
+        <p:spPr>
+          <a:xfrm>
+            <a:off x="4648200" y="2819400"/>
+            <a:ext cx="1561646" cy="400110"/>
+          </a:xfrm>
+          <a:prstGeom prst="rect">
+            <a:avLst/>
+          </a:prstGeom>
+          <a:noFill/>
+        </p:spPr>
+        <p:txBody>
+          <a:bodyPr wrap="none" rtlCol="0">
+            <a:spAutoFit/>
+          </a:bodyPr>
+          <a:lstStyle/>
+          <a:p>
+            <a:r>
+              <a:rPr lang="en-US" sz="2000" i="1" dirty="0" err="1"/>
+              <a:t>f</a:t>
+            </a:r>
+            <a:r>
+              <a:rPr lang="en-US" sz="2000" i="1" baseline="-25000" dirty="0" err="1"/>
+              <a:t>O</a:t>
+            </a:r>
+            <a:r>
+              <a:rPr lang="en-US" sz="2000" i="1" dirty="0"/>
+              <a:t> = </a:t>
+            </a:r>
+            <a:r>
+              <a:rPr lang="en-US" sz="2000" dirty="0"/>
+              <a:t>flow out</a:t>
+            </a:r>
+            <a:endParaRPr lang="en-US" sz="2000" i="1" dirty="0"/>
+          </a:p>
+        </p:txBody>
+      </p:sp>
+      <p:sp>
+        <p:nvSpPr>
+          <p:cNvPr id="38" name="TextBox 37">
+            <a:extLst>
+              <a:ext uri="{FF2B5EF4-FFF2-40B4-BE49-F238E27FC236}">
+                <a16:creationId xmlns:a16="http://schemas.microsoft.com/office/drawing/2014/main" id="{21DA3EB8-2E8A-3443-8B76-53FCB5CD8B05}"/>
+              </a:ext>
+            </a:extLst>
+          </p:cNvPr>
+          <p:cNvSpPr txBox="1"/>
+          <p:nvPr/>
+        </p:nvSpPr>
+        <p:spPr>
+          <a:xfrm>
+            <a:off x="4663913" y="4114800"/>
+            <a:ext cx="1391728" cy="400110"/>
+          </a:xfrm>
+          <a:prstGeom prst="rect">
+            <a:avLst/>
+          </a:prstGeom>
+          <a:noFill/>
+        </p:spPr>
+        <p:txBody>
+          <a:bodyPr wrap="none" rtlCol="0">
+            <a:spAutoFit/>
+          </a:bodyPr>
+          <a:lstStyle/>
+          <a:p>
+            <a:r>
+              <a:rPr lang="en-US" sz="2000" i="1" dirty="0" err="1"/>
+              <a:t>f</a:t>
+            </a:r>
+            <a:r>
+              <a:rPr lang="en-US" sz="2000" i="1" baseline="-25000" dirty="0" err="1"/>
+              <a:t>I</a:t>
+            </a:r>
+            <a:r>
+              <a:rPr lang="en-US" sz="2000" i="1" dirty="0"/>
+              <a:t> = </a:t>
+            </a:r>
+            <a:r>
+              <a:rPr lang="en-US" sz="2000" dirty="0"/>
+              <a:t>flow </a:t>
+            </a:r>
+            <a:r>
+              <a:rPr lang="en-US" sz="2000" dirty="0" err="1"/>
+              <a:t>int</a:t>
+            </a:r>
+            <a:endParaRPr lang="en-US" sz="2000" i="1" dirty="0"/>
+          </a:p>
+        </p:txBody>
+      </p:sp>
+      <p:sp>
+        <p:nvSpPr>
+          <p:cNvPr id="39" name="TextBox 38">
+            <a:extLst>
+              <a:ext uri="{FF2B5EF4-FFF2-40B4-BE49-F238E27FC236}">
+                <a16:creationId xmlns:a16="http://schemas.microsoft.com/office/drawing/2014/main" id="{88ACF1BF-770B-B441-B1EA-22AD84A4319E}"/>
+              </a:ext>
+            </a:extLst>
+          </p:cNvPr>
+          <p:cNvSpPr txBox="1"/>
+          <p:nvPr/>
+        </p:nvSpPr>
+        <p:spPr>
+          <a:xfrm>
+            <a:off x="4663913" y="4572000"/>
+            <a:ext cx="1561646" cy="400110"/>
+          </a:xfrm>
+          <a:prstGeom prst="rect">
+            <a:avLst/>
+          </a:prstGeom>
+          <a:noFill/>
+        </p:spPr>
+        <p:txBody>
+          <a:bodyPr wrap="none" rtlCol="0">
+            <a:spAutoFit/>
+          </a:bodyPr>
+          <a:lstStyle/>
+          <a:p>
+            <a:r>
+              <a:rPr lang="en-US" sz="2000" i="1" dirty="0" err="1"/>
+              <a:t>f</a:t>
+            </a:r>
+            <a:r>
+              <a:rPr lang="en-US" sz="2000" i="1" baseline="-25000" dirty="0" err="1"/>
+              <a:t>O</a:t>
+            </a:r>
+            <a:r>
+              <a:rPr lang="en-US" sz="2000" i="1" dirty="0"/>
+              <a:t> = </a:t>
+            </a:r>
+            <a:r>
+              <a:rPr lang="en-US" sz="2000" dirty="0"/>
+              <a:t>flow out</a:t>
+            </a:r>
+            <a:endParaRPr lang="en-US" sz="2000" i="1" dirty="0"/>
+          </a:p>
+        </p:txBody>
+      </p:sp>
+      <p:sp>
+        <p:nvSpPr>
+          <p:cNvPr id="40" name="TextBox 39">
+            <a:extLst>
+              <a:ext uri="{FF2B5EF4-FFF2-40B4-BE49-F238E27FC236}">
+                <a16:creationId xmlns:a16="http://schemas.microsoft.com/office/drawing/2014/main" id="{41C00973-0069-4E44-9035-5A1C86CDA886}"/>
+              </a:ext>
+            </a:extLst>
+          </p:cNvPr>
+          <p:cNvSpPr txBox="1"/>
+          <p:nvPr/>
+        </p:nvSpPr>
+        <p:spPr>
+          <a:xfrm>
+            <a:off x="4663913" y="4957465"/>
+            <a:ext cx="1316386" cy="400110"/>
+          </a:xfrm>
+          <a:prstGeom prst="rect">
+            <a:avLst/>
+          </a:prstGeom>
+          <a:noFill/>
+        </p:spPr>
+        <p:txBody>
+          <a:bodyPr wrap="none" rtlCol="0">
+            <a:spAutoFit/>
+          </a:bodyPr>
+          <a:lstStyle/>
+          <a:p>
+            <a:r>
+              <a:rPr lang="en-US" sz="2000" i="1" dirty="0"/>
+              <a:t>h = </a:t>
+            </a:r>
+            <a:r>
+              <a:rPr lang="en-US" sz="2000" dirty="0"/>
+              <a:t>height</a:t>
+            </a:r>
+            <a:endParaRPr lang="en-US" sz="2000" i="1" dirty="0"/>
+          </a:p>
+        </p:txBody>
+      </p:sp>
+      <p:sp>
+        <p:nvSpPr>
+          <p:cNvPr id="41" name="TextBox 40">
+            <a:extLst>
+              <a:ext uri="{FF2B5EF4-FFF2-40B4-BE49-F238E27FC236}">
+                <a16:creationId xmlns:a16="http://schemas.microsoft.com/office/drawing/2014/main" id="{22A511D9-1F4A-AC43-BB84-B44AB35F7FBA}"/>
+              </a:ext>
+            </a:extLst>
+          </p:cNvPr>
+          <p:cNvSpPr txBox="1"/>
+          <p:nvPr/>
+        </p:nvSpPr>
+        <p:spPr>
+          <a:xfrm>
+            <a:off x="4648200" y="5772090"/>
+            <a:ext cx="1571264" cy="400110"/>
+          </a:xfrm>
+          <a:prstGeom prst="rect">
+            <a:avLst/>
+          </a:prstGeom>
+          <a:noFill/>
+        </p:spPr>
+        <p:txBody>
+          <a:bodyPr wrap="none" rtlCol="0">
+            <a:spAutoFit/>
+          </a:bodyPr>
+          <a:lstStyle/>
+          <a:p>
+            <a:r>
+              <a:rPr lang="en-US" sz="2000" i="1" dirty="0" err="1"/>
+              <a:t>f</a:t>
+            </a:r>
+            <a:r>
+              <a:rPr lang="en-US" sz="2000" i="1" baseline="-25000" dirty="0" err="1"/>
+              <a:t>S</a:t>
+            </a:r>
+            <a:r>
+              <a:rPr lang="en-US" sz="2000" i="1" dirty="0"/>
+              <a:t> = </a:t>
+            </a:r>
+            <a:r>
+              <a:rPr lang="en-US" sz="2000" dirty="0"/>
+              <a:t>Set flow</a:t>
+            </a:r>
+            <a:endParaRPr lang="en-US" sz="2000" i="1" dirty="0"/>
+          </a:p>
+        </p:txBody>
+      </p:sp>
+      <p:sp>
+        <p:nvSpPr>
+          <p:cNvPr id="8" name="TextBox 7">
+            <a:extLst>
+              <a:ext uri="{FF2B5EF4-FFF2-40B4-BE49-F238E27FC236}">
+                <a16:creationId xmlns:a16="http://schemas.microsoft.com/office/drawing/2014/main" id="{E752C51B-C4FB-314D-B73C-80D999D91103}"/>
+              </a:ext>
+            </a:extLst>
+          </p:cNvPr>
+          <p:cNvSpPr txBox="1"/>
+          <p:nvPr/>
+        </p:nvSpPr>
+        <p:spPr>
+          <a:xfrm>
+            <a:off x="6451893" y="4953000"/>
+            <a:ext cx="1470274" cy="400110"/>
+          </a:xfrm>
+          <a:prstGeom prst="rect">
+            <a:avLst/>
+          </a:prstGeom>
+          <a:noFill/>
+        </p:spPr>
+        <p:txBody>
+          <a:bodyPr wrap="none" rtlCol="0">
+            <a:spAutoFit/>
+          </a:bodyPr>
+          <a:lstStyle/>
+          <a:p>
+            <a:r>
+              <a:rPr lang="en-US" sz="2000" i="1" dirty="0"/>
+              <a:t>m = </a:t>
+            </a:r>
+            <a:r>
+              <a:rPr lang="en-US" sz="2000" dirty="0"/>
+              <a:t>meters</a:t>
+            </a:r>
+            <a:endParaRPr lang="en-US" sz="2000" i="1" dirty="0"/>
+          </a:p>
+        </p:txBody>
+      </p:sp>
+      <p:sp>
+        <p:nvSpPr>
+          <p:cNvPr id="42" name="TextBox 41">
+            <a:extLst>
+              <a:ext uri="{FF2B5EF4-FFF2-40B4-BE49-F238E27FC236}">
+                <a16:creationId xmlns:a16="http://schemas.microsoft.com/office/drawing/2014/main" id="{D659CE20-4B9F-5C4E-891A-FB55693D7C62}"/>
+              </a:ext>
+            </a:extLst>
+          </p:cNvPr>
+          <p:cNvSpPr txBox="1"/>
+          <p:nvPr/>
+        </p:nvSpPr>
+        <p:spPr>
+          <a:xfrm>
+            <a:off x="6451893" y="2814935"/>
+            <a:ext cx="2234907" cy="400110"/>
+          </a:xfrm>
+          <a:prstGeom prst="rect">
+            <a:avLst/>
+          </a:prstGeom>
+          <a:noFill/>
+        </p:spPr>
+        <p:txBody>
+          <a:bodyPr wrap="none" rtlCol="0">
+            <a:spAutoFit/>
+          </a:bodyPr>
+          <a:lstStyle/>
+          <a:p>
+            <a:r>
+              <a:rPr lang="en-US" sz="2000" i="1" dirty="0"/>
+              <a:t>m</a:t>
+            </a:r>
+            <a:r>
+              <a:rPr lang="en-US" sz="2000" i="1" baseline="30000" dirty="0"/>
+              <a:t>3</a:t>
+            </a:r>
+            <a:r>
+              <a:rPr lang="en-US" sz="2000" i="1" dirty="0"/>
+              <a:t> = </a:t>
+            </a:r>
+            <a:r>
+              <a:rPr lang="en-US" sz="2000" dirty="0"/>
+              <a:t>cubic meters</a:t>
+            </a:r>
+            <a:endParaRPr lang="en-US" sz="2000" i="1" dirty="0"/>
+          </a:p>
+        </p:txBody>
+      </p:sp>
+      <p:sp>
+        <p:nvSpPr>
+          <p:cNvPr id="43" name="TextBox 42">
+            <a:extLst>
+              <a:ext uri="{FF2B5EF4-FFF2-40B4-BE49-F238E27FC236}">
+                <a16:creationId xmlns:a16="http://schemas.microsoft.com/office/drawing/2014/main" id="{B53A95AB-A7C2-CD47-9DCC-1F4293D86CE8}"/>
+              </a:ext>
+            </a:extLst>
+          </p:cNvPr>
+          <p:cNvSpPr txBox="1"/>
+          <p:nvPr/>
+        </p:nvSpPr>
+        <p:spPr>
+          <a:xfrm>
+            <a:off x="6451893" y="4095690"/>
+            <a:ext cx="2234907" cy="400110"/>
+          </a:xfrm>
+          <a:prstGeom prst="rect">
+            <a:avLst/>
+          </a:prstGeom>
+          <a:noFill/>
+        </p:spPr>
+        <p:txBody>
+          <a:bodyPr wrap="none" rtlCol="0">
+            <a:spAutoFit/>
+          </a:bodyPr>
+          <a:lstStyle/>
+          <a:p>
+            <a:r>
+              <a:rPr lang="en-US" sz="2000" i="1" dirty="0"/>
+              <a:t>m</a:t>
+            </a:r>
+            <a:r>
+              <a:rPr lang="en-US" sz="2000" i="1" baseline="30000" dirty="0"/>
+              <a:t>3</a:t>
+            </a:r>
+            <a:r>
+              <a:rPr lang="en-US" sz="2000" i="1" dirty="0"/>
+              <a:t> = </a:t>
+            </a:r>
+            <a:r>
+              <a:rPr lang="en-US" sz="2000" dirty="0"/>
+              <a:t>cubic meters</a:t>
+            </a:r>
+            <a:endParaRPr lang="en-US" sz="2000" i="1" dirty="0"/>
+          </a:p>
+        </p:txBody>
+      </p:sp>
+      <p:sp>
+        <p:nvSpPr>
+          <p:cNvPr id="44" name="TextBox 43">
+            <a:extLst>
+              <a:ext uri="{FF2B5EF4-FFF2-40B4-BE49-F238E27FC236}">
+                <a16:creationId xmlns:a16="http://schemas.microsoft.com/office/drawing/2014/main" id="{3DC157A2-EE64-FF4F-8713-81E95A96AB2A}"/>
+              </a:ext>
+            </a:extLst>
+          </p:cNvPr>
+          <p:cNvSpPr txBox="1"/>
+          <p:nvPr/>
+        </p:nvSpPr>
+        <p:spPr>
+          <a:xfrm>
+            <a:off x="6451893" y="4552890"/>
+            <a:ext cx="2234907" cy="400110"/>
+          </a:xfrm>
+          <a:prstGeom prst="rect">
+            <a:avLst/>
+          </a:prstGeom>
+          <a:noFill/>
+        </p:spPr>
+        <p:txBody>
+          <a:bodyPr wrap="none" rtlCol="0">
+            <a:spAutoFit/>
+          </a:bodyPr>
+          <a:lstStyle/>
+          <a:p>
+            <a:r>
+              <a:rPr lang="en-US" sz="2000" i="1" dirty="0"/>
+              <a:t>m</a:t>
+            </a:r>
+            <a:r>
+              <a:rPr lang="en-US" sz="2000" i="1" baseline="30000" dirty="0"/>
+              <a:t>3</a:t>
+            </a:r>
+            <a:r>
+              <a:rPr lang="en-US" sz="2000" i="1" dirty="0"/>
+              <a:t> = </a:t>
+            </a:r>
+            <a:r>
+              <a:rPr lang="en-US" sz="2000" dirty="0"/>
+              <a:t>cubic meters</a:t>
+            </a:r>
+            <a:endParaRPr lang="en-US" sz="2000" i="1" dirty="0"/>
+          </a:p>
+        </p:txBody>
+      </p:sp>
+      <p:sp>
+        <p:nvSpPr>
+          <p:cNvPr id="45" name="TextBox 44">
+            <a:extLst>
+              <a:ext uri="{FF2B5EF4-FFF2-40B4-BE49-F238E27FC236}">
+                <a16:creationId xmlns:a16="http://schemas.microsoft.com/office/drawing/2014/main" id="{42099944-9660-EB43-A1E4-61E932405681}"/>
+              </a:ext>
+            </a:extLst>
+          </p:cNvPr>
+          <p:cNvSpPr txBox="1"/>
+          <p:nvPr/>
+        </p:nvSpPr>
+        <p:spPr>
+          <a:xfrm>
+            <a:off x="6451893" y="5752980"/>
+            <a:ext cx="2234907" cy="400110"/>
+          </a:xfrm>
+          <a:prstGeom prst="rect">
+            <a:avLst/>
+          </a:prstGeom>
+          <a:noFill/>
+        </p:spPr>
+        <p:txBody>
+          <a:bodyPr wrap="none" rtlCol="0">
+            <a:spAutoFit/>
+          </a:bodyPr>
+          <a:lstStyle/>
+          <a:p>
+            <a:r>
+              <a:rPr lang="en-US" sz="2000" i="1" dirty="0"/>
+              <a:t>m</a:t>
+            </a:r>
+            <a:r>
+              <a:rPr lang="en-US" sz="2000" i="1" baseline="30000" dirty="0"/>
+              <a:t>3</a:t>
+            </a:r>
+            <a:r>
+              <a:rPr lang="en-US" sz="2000" i="1" dirty="0"/>
+              <a:t> = </a:t>
+            </a:r>
+            <a:r>
+              <a:rPr lang="en-US" sz="2000" dirty="0"/>
+              <a:t>cubic meters</a:t>
+            </a:r>
+            <a:endParaRPr lang="en-US" sz="2000" i="1" dirty="0"/>
+          </a:p>
+        </p:txBody>
+      </p:sp>
     </p:spTree>
     <p:extLst>
       <p:ext uri="{BB962C8B-B14F-4D97-AF65-F5344CB8AC3E}">
-        <p14:creationId xmlns:p14="http://schemas.microsoft.com/office/powerpoint/2010/main" val="2851440819"/>
+        <p14:creationId xmlns:p14="http://schemas.microsoft.com/office/powerpoint/2010/main" val="3881872036"/>
       </p:ext>
     </p:extLst>
   </p:cSld>

</xml_diff>